<commit_message>
Worked on Expose Document and Powerpoint
</commit_message>
<xml_diff>
--- a/Reports/Expose.pptx
+++ b/Reports/Expose.pptx
@@ -9,6 +9,10 @@
     <p:sldId id="257" r:id="rId3"/>
     <p:sldId id="258" r:id="rId4"/>
     <p:sldId id="259" r:id="rId5"/>
+    <p:sldId id="260" r:id="rId6"/>
+    <p:sldId id="261" r:id="rId7"/>
+    <p:sldId id="262" r:id="rId8"/>
+    <p:sldId id="263" r:id="rId9"/>
   </p:sldIdLst>
   <p:sldSz cx="12192000" cy="6858000"/>
   <p:notesSz cx="6858000" cy="9144000"/>
@@ -116,6 +120,10 @@
             <p14:sldId id="257"/>
             <p14:sldId id="258"/>
             <p14:sldId id="259"/>
+            <p14:sldId id="260"/>
+            <p14:sldId id="261"/>
+            <p14:sldId id="262"/>
+            <p14:sldId id="263"/>
           </p14:sldIdLst>
         </p14:section>
       </p14:sectionLst>
@@ -130,13 +138,218 @@
 <file path=ppt/revisionInfo.xml><?xml version="1.0" encoding="utf-8"?>
 <p1510:revInfo xmlns:a="http://schemas.openxmlformats.org/drawingml/2006/main" xmlns:r="http://schemas.openxmlformats.org/officeDocument/2006/relationships" xmlns:p1510="http://schemas.microsoft.com/office/powerpoint/2015/10/main">
   <p1510:revLst>
-    <p1510:client id="{0AB47DDF-A20D-475E-92BA-C0DE3A31CC2D}" v="3" dt="2020-11-22T09:29:10.228"/>
+    <p1510:client id="{9F0FD894-C20B-4128-844C-F7121009B276}" v="484" dt="2020-11-26T14:10:35.781"/>
   </p1510:revLst>
 </p1510:revInfo>
 </file>
 
 <file path=ppt/changesInfos/changesInfo1.xml><?xml version="1.0" encoding="utf-8"?>
 <pc:chgInfo xmlns:a="http://schemas.openxmlformats.org/drawingml/2006/main" xmlns:r="http://schemas.openxmlformats.org/officeDocument/2006/relationships" xmlns:ac="http://schemas.microsoft.com/office/drawing/2013/main/command" xmlns:pc="http://schemas.microsoft.com/office/powerpoint/2013/main/command">
+  <pc:docChgLst>
+    <pc:chgData name="Ethan Swistak" userId="191963e6660c0878" providerId="LiveId" clId="{9F0FD894-C20B-4128-844C-F7121009B276}"/>
+    <pc:docChg chg="custSel addSld modSld modSection">
+      <pc:chgData name="Ethan Swistak" userId="191963e6660c0878" providerId="LiveId" clId="{9F0FD894-C20B-4128-844C-F7121009B276}" dt="2020-11-26T14:13:34.083" v="1391" actId="5793"/>
+      <pc:docMkLst>
+        <pc:docMk/>
+      </pc:docMkLst>
+      <pc:sldChg chg="addSp delSp modSp new mod modClrScheme chgLayout">
+        <pc:chgData name="Ethan Swistak" userId="191963e6660c0878" providerId="LiveId" clId="{9F0FD894-C20B-4128-844C-F7121009B276}" dt="2020-11-26T13:37:55.821" v="327" actId="20577"/>
+        <pc:sldMkLst>
+          <pc:docMk/>
+          <pc:sldMk cId="2675239192" sldId="260"/>
+        </pc:sldMkLst>
+        <pc:spChg chg="mod ord">
+          <ac:chgData name="Ethan Swistak" userId="191963e6660c0878" providerId="LiveId" clId="{9F0FD894-C20B-4128-844C-F7121009B276}" dt="2020-11-26T10:55:38.099" v="32" actId="700"/>
+          <ac:spMkLst>
+            <pc:docMk/>
+            <pc:sldMk cId="2675239192" sldId="260"/>
+            <ac:spMk id="2" creationId="{F1E542B2-0506-482D-83B3-668D8E91F30C}"/>
+          </ac:spMkLst>
+        </pc:spChg>
+        <pc:spChg chg="del">
+          <ac:chgData name="Ethan Swistak" userId="191963e6660c0878" providerId="LiveId" clId="{9F0FD894-C20B-4128-844C-F7121009B276}" dt="2020-11-26T10:55:23.480" v="29"/>
+          <ac:spMkLst>
+            <pc:docMk/>
+            <pc:sldMk cId="2675239192" sldId="260"/>
+            <ac:spMk id="3" creationId="{70530B51-64FE-4C10-B2BA-972D249CD44B}"/>
+          </ac:spMkLst>
+        </pc:spChg>
+        <pc:spChg chg="add mod ord">
+          <ac:chgData name="Ethan Swistak" userId="191963e6660c0878" providerId="LiveId" clId="{9F0FD894-C20B-4128-844C-F7121009B276}" dt="2020-11-26T13:37:55.821" v="327" actId="20577"/>
+          <ac:spMkLst>
+            <pc:docMk/>
+            <pc:sldMk cId="2675239192" sldId="260"/>
+            <ac:spMk id="5" creationId="{B9A1EEB0-49B2-4EC9-966E-AB791CE89C99}"/>
+          </ac:spMkLst>
+        </pc:spChg>
+        <pc:spChg chg="add del mod">
+          <ac:chgData name="Ethan Swistak" userId="191963e6660c0878" providerId="LiveId" clId="{9F0FD894-C20B-4128-844C-F7121009B276}" dt="2020-11-26T11:11:46.257" v="150" actId="478"/>
+          <ac:spMkLst>
+            <pc:docMk/>
+            <pc:sldMk cId="2675239192" sldId="260"/>
+            <ac:spMk id="7" creationId="{DB314F35-AFEA-4C12-9110-1F869E9DC616}"/>
+          </ac:spMkLst>
+        </pc:spChg>
+        <pc:picChg chg="add mod ord">
+          <ac:chgData name="Ethan Swistak" userId="191963e6660c0878" providerId="LiveId" clId="{9F0FD894-C20B-4128-844C-F7121009B276}" dt="2020-11-26T10:55:38.099" v="32" actId="700"/>
+          <ac:picMkLst>
+            <pc:docMk/>
+            <pc:sldMk cId="2675239192" sldId="260"/>
+            <ac:picMk id="4" creationId="{E7435907-07CE-4461-A0B0-47ADA32F96AE}"/>
+          </ac:picMkLst>
+        </pc:picChg>
+        <pc:picChg chg="add del mod">
+          <ac:chgData name="Ethan Swistak" userId="191963e6660c0878" providerId="LiveId" clId="{9F0FD894-C20B-4128-844C-F7121009B276}" dt="2020-11-26T11:11:16.730" v="143" actId="478"/>
+          <ac:picMkLst>
+            <pc:docMk/>
+            <pc:sldMk cId="2675239192" sldId="260"/>
+            <ac:picMk id="6" creationId="{E0F52E4B-F542-420A-96DF-E4E3421F0CA1}"/>
+          </ac:picMkLst>
+        </pc:picChg>
+      </pc:sldChg>
+      <pc:sldChg chg="addSp delSp modSp new mod modClrScheme chgLayout">
+        <pc:chgData name="Ethan Swistak" userId="191963e6660c0878" providerId="LiveId" clId="{9F0FD894-C20B-4128-844C-F7121009B276}" dt="2020-11-26T13:47:40.569" v="636" actId="20577"/>
+        <pc:sldMkLst>
+          <pc:docMk/>
+          <pc:sldMk cId="202815015" sldId="261"/>
+        </pc:sldMkLst>
+        <pc:spChg chg="mod ord">
+          <ac:chgData name="Ethan Swistak" userId="191963e6660c0878" providerId="LiveId" clId="{9F0FD894-C20B-4128-844C-F7121009B276}" dt="2020-11-26T13:42:31.390" v="354" actId="700"/>
+          <ac:spMkLst>
+            <pc:docMk/>
+            <pc:sldMk cId="202815015" sldId="261"/>
+            <ac:spMk id="2" creationId="{16E45FD4-5ED1-4E6C-B2BE-70DDFFDDA079}"/>
+          </ac:spMkLst>
+        </pc:spChg>
+        <pc:spChg chg="del mod">
+          <ac:chgData name="Ethan Swistak" userId="191963e6660c0878" providerId="LiveId" clId="{9F0FD894-C20B-4128-844C-F7121009B276}" dt="2020-11-26T13:42:04.605" v="351"/>
+          <ac:spMkLst>
+            <pc:docMk/>
+            <pc:sldMk cId="202815015" sldId="261"/>
+            <ac:spMk id="3" creationId="{6E0F8A39-B269-4611-B816-69935C774672}"/>
+          </ac:spMkLst>
+        </pc:spChg>
+        <pc:spChg chg="add mod ord">
+          <ac:chgData name="Ethan Swistak" userId="191963e6660c0878" providerId="LiveId" clId="{9F0FD894-C20B-4128-844C-F7121009B276}" dt="2020-11-26T13:42:38.782" v="372" actId="20577"/>
+          <ac:spMkLst>
+            <pc:docMk/>
+            <pc:sldMk cId="202815015" sldId="261"/>
+            <ac:spMk id="5" creationId="{243CCD26-6C28-4DA0-8692-A3FD7E8AABF1}"/>
+          </ac:spMkLst>
+        </pc:spChg>
+        <pc:spChg chg="add mod ord">
+          <ac:chgData name="Ethan Swistak" userId="191963e6660c0878" providerId="LiveId" clId="{9F0FD894-C20B-4128-844C-F7121009B276}" dt="2020-11-26T13:47:40.569" v="636" actId="20577"/>
+          <ac:spMkLst>
+            <pc:docMk/>
+            <pc:sldMk cId="202815015" sldId="261"/>
+            <ac:spMk id="6" creationId="{7C0D8B6C-A478-41CC-BAF5-3841EA0E038C}"/>
+          </ac:spMkLst>
+        </pc:spChg>
+        <pc:spChg chg="add mod ord">
+          <ac:chgData name="Ethan Swistak" userId="191963e6660c0878" providerId="LiveId" clId="{9F0FD894-C20B-4128-844C-F7121009B276}" dt="2020-11-26T13:46:18.594" v="622" actId="20577"/>
+          <ac:spMkLst>
+            <pc:docMk/>
+            <pc:sldMk cId="202815015" sldId="261"/>
+            <ac:spMk id="7" creationId="{0A1FEDB9-8263-47A7-A62E-6721A3F366DC}"/>
+          </ac:spMkLst>
+        </pc:spChg>
+        <pc:spChg chg="add del mod">
+          <ac:chgData name="Ethan Swistak" userId="191963e6660c0878" providerId="LiveId" clId="{9F0FD894-C20B-4128-844C-F7121009B276}" dt="2020-11-26T13:47:22.019" v="624"/>
+          <ac:spMkLst>
+            <pc:docMk/>
+            <pc:sldMk cId="202815015" sldId="261"/>
+            <ac:spMk id="9" creationId="{CD90C541-BBCD-4D7B-81A5-24E25B0019D1}"/>
+          </ac:spMkLst>
+        </pc:spChg>
+        <pc:picChg chg="add del mod ord">
+          <ac:chgData name="Ethan Swistak" userId="191963e6660c0878" providerId="LiveId" clId="{9F0FD894-C20B-4128-844C-F7121009B276}" dt="2020-11-26T13:47:14.465" v="623" actId="478"/>
+          <ac:picMkLst>
+            <pc:docMk/>
+            <pc:sldMk cId="202815015" sldId="261"/>
+            <ac:picMk id="4" creationId="{0B33EF5E-51D9-4F7D-A588-3B5168228584}"/>
+          </ac:picMkLst>
+        </pc:picChg>
+        <pc:picChg chg="add mod">
+          <ac:chgData name="Ethan Swistak" userId="191963e6660c0878" providerId="LiveId" clId="{9F0FD894-C20B-4128-844C-F7121009B276}" dt="2020-11-26T13:47:24.266" v="625" actId="1076"/>
+          <ac:picMkLst>
+            <pc:docMk/>
+            <pc:sldMk cId="202815015" sldId="261"/>
+            <ac:picMk id="10" creationId="{F681C245-75E1-42D0-B722-105F52AE7DA3}"/>
+          </ac:picMkLst>
+        </pc:picChg>
+      </pc:sldChg>
+      <pc:sldChg chg="addSp delSp modSp new mod modClrScheme chgLayout">
+        <pc:chgData name="Ethan Swistak" userId="191963e6660c0878" providerId="LiveId" clId="{9F0FD894-C20B-4128-844C-F7121009B276}" dt="2020-11-26T14:02:51.706" v="1081" actId="20577"/>
+        <pc:sldMkLst>
+          <pc:docMk/>
+          <pc:sldMk cId="4112332680" sldId="262"/>
+        </pc:sldMkLst>
+        <pc:spChg chg="mod ord">
+          <ac:chgData name="Ethan Swistak" userId="191963e6660c0878" providerId="LiveId" clId="{9F0FD894-C20B-4128-844C-F7121009B276}" dt="2020-11-26T13:48:09.698" v="664" actId="700"/>
+          <ac:spMkLst>
+            <pc:docMk/>
+            <pc:sldMk cId="4112332680" sldId="262"/>
+            <ac:spMk id="2" creationId="{4D0A5BD2-B87F-4D7C-809F-04261CB55168}"/>
+          </ac:spMkLst>
+        </pc:spChg>
+        <pc:spChg chg="del mod ord">
+          <ac:chgData name="Ethan Swistak" userId="191963e6660c0878" providerId="LiveId" clId="{9F0FD894-C20B-4128-844C-F7121009B276}" dt="2020-11-26T13:48:09.698" v="664" actId="700"/>
+          <ac:spMkLst>
+            <pc:docMk/>
+            <pc:sldMk cId="4112332680" sldId="262"/>
+            <ac:spMk id="3" creationId="{167BBD7E-1373-43FE-AAD0-7F2FCFD90473}"/>
+          </ac:spMkLst>
+        </pc:spChg>
+        <pc:spChg chg="add del mod ord">
+          <ac:chgData name="Ethan Swistak" userId="191963e6660c0878" providerId="LiveId" clId="{9F0FD894-C20B-4128-844C-F7121009B276}" dt="2020-11-26T13:49:09.570" v="665"/>
+          <ac:spMkLst>
+            <pc:docMk/>
+            <pc:sldMk cId="4112332680" sldId="262"/>
+            <ac:spMk id="4" creationId="{27224119-9DF6-43CF-8A9E-3427F74C7D55}"/>
+          </ac:spMkLst>
+        </pc:spChg>
+        <pc:spChg chg="add mod ord">
+          <ac:chgData name="Ethan Swistak" userId="191963e6660c0878" providerId="LiveId" clId="{9F0FD894-C20B-4128-844C-F7121009B276}" dt="2020-11-26T14:02:51.706" v="1081" actId="20577"/>
+          <ac:spMkLst>
+            <pc:docMk/>
+            <pc:sldMk cId="4112332680" sldId="262"/>
+            <ac:spMk id="5" creationId="{F33B89D5-3A82-408F-97A1-CDBE8DD691FD}"/>
+          </ac:spMkLst>
+        </pc:spChg>
+        <pc:picChg chg="add mod">
+          <ac:chgData name="Ethan Swistak" userId="191963e6660c0878" providerId="LiveId" clId="{9F0FD894-C20B-4128-844C-F7121009B276}" dt="2020-11-26T13:50:06.353" v="669" actId="1076"/>
+          <ac:picMkLst>
+            <pc:docMk/>
+            <pc:sldMk cId="4112332680" sldId="262"/>
+            <ac:picMk id="6" creationId="{D8B87AFB-1F25-4D75-8537-CA50BE3C90FA}"/>
+          </ac:picMkLst>
+        </pc:picChg>
+      </pc:sldChg>
+      <pc:sldChg chg="modSp new mod">
+        <pc:chgData name="Ethan Swistak" userId="191963e6660c0878" providerId="LiveId" clId="{9F0FD894-C20B-4128-844C-F7121009B276}" dt="2020-11-26T14:13:34.083" v="1391" actId="5793"/>
+        <pc:sldMkLst>
+          <pc:docMk/>
+          <pc:sldMk cId="3978024795" sldId="263"/>
+        </pc:sldMkLst>
+        <pc:spChg chg="mod">
+          <ac:chgData name="Ethan Swistak" userId="191963e6660c0878" providerId="LiveId" clId="{9F0FD894-C20B-4128-844C-F7121009B276}" dt="2020-11-26T14:12:51.017" v="1390" actId="20577"/>
+          <ac:spMkLst>
+            <pc:docMk/>
+            <pc:sldMk cId="3978024795" sldId="263"/>
+            <ac:spMk id="2" creationId="{EF199DF5-E4BD-467F-AA35-B360C767A9C7}"/>
+          </ac:spMkLst>
+        </pc:spChg>
+        <pc:spChg chg="mod">
+          <ac:chgData name="Ethan Swistak" userId="191963e6660c0878" providerId="LiveId" clId="{9F0FD894-C20B-4128-844C-F7121009B276}" dt="2020-11-26T14:13:34.083" v="1391" actId="5793"/>
+          <ac:spMkLst>
+            <pc:docMk/>
+            <pc:sldMk cId="3978024795" sldId="263"/>
+            <ac:spMk id="3" creationId="{4F171CC9-D5DF-4995-8D41-41095F73D8D8}"/>
+          </ac:spMkLst>
+        </pc:spChg>
+      </pc:sldChg>
+    </pc:docChg>
+  </pc:docChgLst>
   <pc:docChgLst>
     <pc:chgData name="Ethan Swistak" userId="191963e6660c0878" providerId="LiveId" clId="{0AB47DDF-A20D-475E-92BA-C0DE3A31CC2D}"/>
     <pc:docChg chg="undo custSel mod addSld delSld modSld addSection delSection modSection">
@@ -428,7 +641,7 @@
           <a:p>
             <a:fld id="{36F56D17-3085-4754-B199-8B7764978367}" type="datetimeFigureOut">
               <a:rPr lang="en-US" smtClean="0"/>
-              <a:t>11/22/2020</a:t>
+              <a:t>11/26/2020</a:t>
             </a:fld>
             <a:endParaRPr lang="en-US"/>
           </a:p>
@@ -626,7 +839,7 @@
           <a:p>
             <a:fld id="{36F56D17-3085-4754-B199-8B7764978367}" type="datetimeFigureOut">
               <a:rPr lang="en-US" smtClean="0"/>
-              <a:t>11/22/2020</a:t>
+              <a:t>11/26/2020</a:t>
             </a:fld>
             <a:endParaRPr lang="en-US"/>
           </a:p>
@@ -834,7 +1047,7 @@
           <a:p>
             <a:fld id="{36F56D17-3085-4754-B199-8B7764978367}" type="datetimeFigureOut">
               <a:rPr lang="en-US" smtClean="0"/>
-              <a:t>11/22/2020</a:t>
+              <a:t>11/26/2020</a:t>
             </a:fld>
             <a:endParaRPr lang="en-US"/>
           </a:p>
@@ -1032,7 +1245,7 @@
           <a:p>
             <a:fld id="{36F56D17-3085-4754-B199-8B7764978367}" type="datetimeFigureOut">
               <a:rPr lang="en-US" smtClean="0"/>
-              <a:t>11/22/2020</a:t>
+              <a:t>11/26/2020</a:t>
             </a:fld>
             <a:endParaRPr lang="en-US"/>
           </a:p>
@@ -1307,7 +1520,7 @@
           <a:p>
             <a:fld id="{36F56D17-3085-4754-B199-8B7764978367}" type="datetimeFigureOut">
               <a:rPr lang="en-US" smtClean="0"/>
-              <a:t>11/22/2020</a:t>
+              <a:t>11/26/2020</a:t>
             </a:fld>
             <a:endParaRPr lang="en-US"/>
           </a:p>
@@ -1572,7 +1785,7 @@
           <a:p>
             <a:fld id="{36F56D17-3085-4754-B199-8B7764978367}" type="datetimeFigureOut">
               <a:rPr lang="en-US" smtClean="0"/>
-              <a:t>11/22/2020</a:t>
+              <a:t>11/26/2020</a:t>
             </a:fld>
             <a:endParaRPr lang="en-US"/>
           </a:p>
@@ -1984,7 +2197,7 @@
           <a:p>
             <a:fld id="{36F56D17-3085-4754-B199-8B7764978367}" type="datetimeFigureOut">
               <a:rPr lang="en-US" smtClean="0"/>
-              <a:t>11/22/2020</a:t>
+              <a:t>11/26/2020</a:t>
             </a:fld>
             <a:endParaRPr lang="en-US"/>
           </a:p>
@@ -2125,7 +2338,7 @@
           <a:p>
             <a:fld id="{36F56D17-3085-4754-B199-8B7764978367}" type="datetimeFigureOut">
               <a:rPr lang="en-US" smtClean="0"/>
-              <a:t>11/22/2020</a:t>
+              <a:t>11/26/2020</a:t>
             </a:fld>
             <a:endParaRPr lang="en-US"/>
           </a:p>
@@ -2238,7 +2451,7 @@
           <a:p>
             <a:fld id="{36F56D17-3085-4754-B199-8B7764978367}" type="datetimeFigureOut">
               <a:rPr lang="en-US" smtClean="0"/>
-              <a:t>11/22/2020</a:t>
+              <a:t>11/26/2020</a:t>
             </a:fld>
             <a:endParaRPr lang="en-US"/>
           </a:p>
@@ -2549,7 +2762,7 @@
           <a:p>
             <a:fld id="{36F56D17-3085-4754-B199-8B7764978367}" type="datetimeFigureOut">
               <a:rPr lang="en-US" smtClean="0"/>
-              <a:t>11/22/2020</a:t>
+              <a:t>11/26/2020</a:t>
             </a:fld>
             <a:endParaRPr lang="en-US"/>
           </a:p>
@@ -2837,7 +3050,7 @@
           <a:p>
             <a:fld id="{36F56D17-3085-4754-B199-8B7764978367}" type="datetimeFigureOut">
               <a:rPr lang="en-US" smtClean="0"/>
-              <a:t>11/22/2020</a:t>
+              <a:t>11/26/2020</a:t>
             </a:fld>
             <a:endParaRPr lang="en-US"/>
           </a:p>
@@ -3078,7 +3291,7 @@
           <a:p>
             <a:fld id="{36F56D17-3085-4754-B199-8B7764978367}" type="datetimeFigureOut">
               <a:rPr lang="en-US" smtClean="0"/>
-              <a:t>11/22/2020</a:t>
+              <a:t>11/26/2020</a:t>
             </a:fld>
             <a:endParaRPr lang="en-US"/>
           </a:p>
@@ -4230,6 +4443,1932 @@
 </p:sld>
 </file>
 
+<file path=ppt/slides/slide5.xml><?xml version="1.0" encoding="utf-8"?>
+<p:sld xmlns:a="http://schemas.openxmlformats.org/drawingml/2006/main" xmlns:r="http://schemas.openxmlformats.org/officeDocument/2006/relationships" xmlns:p="http://schemas.openxmlformats.org/presentationml/2006/main">
+  <p:cSld>
+    <p:spTree>
+      <p:nvGrpSpPr>
+        <p:cNvPr id="1" name=""/>
+        <p:cNvGrpSpPr/>
+        <p:nvPr/>
+      </p:nvGrpSpPr>
+      <p:grpSpPr>
+        <a:xfrm>
+          <a:off x="0" y="0"/>
+          <a:ext cx="0" cy="0"/>
+          <a:chOff x="0" y="0"/>
+          <a:chExt cx="0" cy="0"/>
+        </a:xfrm>
+      </p:grpSpPr>
+      <p:sp>
+        <p:nvSpPr>
+          <p:cNvPr id="2" name="Title 1">
+            <a:extLst>
+              <a:ext uri="{FF2B5EF4-FFF2-40B4-BE49-F238E27FC236}">
+                <a16:creationId xmlns:a16="http://schemas.microsoft.com/office/drawing/2014/main" id="{F1E542B2-0506-482D-83B3-668D8E91F30C}"/>
+              </a:ext>
+            </a:extLst>
+          </p:cNvPr>
+          <p:cNvSpPr>
+            <a:spLocks noGrp="1"/>
+          </p:cNvSpPr>
+          <p:nvPr>
+            <p:ph type="title"/>
+          </p:nvPr>
+        </p:nvSpPr>
+        <p:spPr/>
+        <p:txBody>
+          <a:bodyPr/>
+          <a:lstStyle/>
+          <a:p>
+            <a:r>
+              <a:rPr lang="en-US" dirty="0"/>
+              <a:t>Pre-Processing Layer</a:t>
+            </a:r>
+          </a:p>
+        </p:txBody>
+      </p:sp>
+      <p:pic>
+        <p:nvPicPr>
+          <p:cNvPr id="4" name="Content Placeholder 3">
+            <a:extLst>
+              <a:ext uri="{FF2B5EF4-FFF2-40B4-BE49-F238E27FC236}">
+                <a16:creationId xmlns:a16="http://schemas.microsoft.com/office/drawing/2014/main" id="{E7435907-07CE-4461-A0B0-47ADA32F96AE}"/>
+              </a:ext>
+            </a:extLst>
+          </p:cNvPr>
+          <p:cNvPicPr>
+            <a:picLocks noGrp="1" noChangeAspect="1"/>
+          </p:cNvPicPr>
+          <p:nvPr>
+            <p:ph sz="half" idx="1"/>
+          </p:nvPr>
+        </p:nvPicPr>
+        <p:blipFill>
+          <a:blip r:embed="rId2"/>
+          <a:stretch>
+            <a:fillRect/>
+          </a:stretch>
+        </p:blipFill>
+        <p:spPr>
+          <a:xfrm>
+            <a:off x="838200" y="3442047"/>
+            <a:ext cx="5181600" cy="1118494"/>
+          </a:xfrm>
+          <a:prstGeom prst="rect">
+            <a:avLst/>
+          </a:prstGeom>
+        </p:spPr>
+      </p:pic>
+      <mc:AlternateContent xmlns:mc="http://schemas.openxmlformats.org/markup-compatibility/2006">
+        <mc:Choice xmlns:a14="http://schemas.microsoft.com/office/drawing/2010/main" Requires="a14">
+          <p:sp>
+            <p:nvSpPr>
+              <p:cNvPr id="5" name="Content Placeholder 4">
+                <a:extLst>
+                  <a:ext uri="{FF2B5EF4-FFF2-40B4-BE49-F238E27FC236}">
+                    <a16:creationId xmlns:a16="http://schemas.microsoft.com/office/drawing/2014/main" id="{B9A1EEB0-49B2-4EC9-966E-AB791CE89C99}"/>
+                  </a:ext>
+                </a:extLst>
+              </p:cNvPr>
+              <p:cNvSpPr>
+                <a:spLocks noGrp="1"/>
+              </p:cNvSpPr>
+              <p:nvPr>
+                <p:ph sz="half" idx="2"/>
+              </p:nvPr>
+            </p:nvSpPr>
+            <p:spPr/>
+            <p:txBody>
+              <a:bodyPr>
+                <a:normAutofit fontScale="92500" lnSpcReduction="10000"/>
+              </a:bodyPr>
+              <a:lstStyle/>
+              <a:p>
+                <a:r>
+                  <a:rPr lang="en-US" dirty="0"/>
+                  <a:t>Pre-emphasis:</a:t>
+                </a:r>
+              </a:p>
+              <a:p>
+                <a:pPr lvl="1"/>
+                <a:r>
+                  <a:rPr lang="en-US" dirty="0"/>
+                  <a:t> Y[n] = X[n] – α X[n-1]</a:t>
+                </a:r>
+              </a:p>
+              <a:p>
+                <a:r>
+                  <a:rPr lang="en-US" dirty="0"/>
+                  <a:t>Framing:</a:t>
+                </a:r>
+              </a:p>
+              <a:p>
+                <a:pPr lvl="1"/>
+                <a:r>
+                  <a:rPr lang="en-US" dirty="0"/>
+                  <a:t>3- Second Window</a:t>
+                </a:r>
+              </a:p>
+              <a:p>
+                <a:r>
+                  <a:rPr lang="en-US" dirty="0"/>
+                  <a:t>Hamming Window:</a:t>
+                </a:r>
+              </a:p>
+              <a:p>
+                <a:pPr lvl="1"/>
+                <a14:m>
+                  <m:oMath xmlns:m="http://schemas.openxmlformats.org/officeDocument/2006/math">
+                    <m:r>
+                      <a:rPr lang="en-US" b="0" i="1" smtClean="0">
+                        <a:latin typeface="Cambria Math" panose="02040503050406030204" pitchFamily="18" charset="0"/>
+                      </a:rPr>
+                      <m:t>𝐻</m:t>
+                    </m:r>
+                    <m:d>
+                      <m:dPr>
+                        <m:ctrlPr>
+                          <a:rPr lang="en-US" b="0" i="1" smtClean="0">
+                            <a:latin typeface="Cambria Math" panose="02040503050406030204" pitchFamily="18" charset="0"/>
+                          </a:rPr>
+                        </m:ctrlPr>
+                      </m:dPr>
+                      <m:e>
+                        <m:r>
+                          <a:rPr lang="en-US" b="0" i="1" smtClean="0">
+                            <a:latin typeface="Cambria Math" panose="02040503050406030204" pitchFamily="18" charset="0"/>
+                            <a:ea typeface="Cambria Math" panose="02040503050406030204" pitchFamily="18" charset="0"/>
+                          </a:rPr>
+                          <m:t>𝜃</m:t>
+                        </m:r>
+                      </m:e>
+                    </m:d>
+                    <m:r>
+                      <a:rPr lang="en-US" b="0" i="1" smtClean="0">
+                        <a:latin typeface="Cambria Math" panose="02040503050406030204" pitchFamily="18" charset="0"/>
+                        <a:ea typeface="Cambria Math" panose="02040503050406030204" pitchFamily="18" charset="0"/>
+                      </a:rPr>
+                      <m:t>=0.54+0.46</m:t>
+                    </m:r>
+                    <m:func>
+                      <m:funcPr>
+                        <m:ctrlPr>
+                          <a:rPr lang="en-US" b="0" i="1" smtClean="0">
+                            <a:latin typeface="Cambria Math" panose="02040503050406030204" pitchFamily="18" charset="0"/>
+                            <a:ea typeface="Cambria Math" panose="02040503050406030204" pitchFamily="18" charset="0"/>
+                          </a:rPr>
+                        </m:ctrlPr>
+                      </m:funcPr>
+                      <m:fName>
+                        <m:r>
+                          <m:rPr>
+                            <m:sty m:val="p"/>
+                          </m:rPr>
+                          <a:rPr lang="en-US" b="0" i="0" smtClean="0">
+                            <a:latin typeface="Cambria Math" panose="02040503050406030204" pitchFamily="18" charset="0"/>
+                            <a:ea typeface="Cambria Math" panose="02040503050406030204" pitchFamily="18" charset="0"/>
+                          </a:rPr>
+                          <m:t>cos</m:t>
+                        </m:r>
+                      </m:fName>
+                      <m:e>
+                        <m:r>
+                          <a:rPr lang="en-US" b="0" i="1" smtClean="0">
+                            <a:latin typeface="Cambria Math" panose="02040503050406030204" pitchFamily="18" charset="0"/>
+                            <a:ea typeface="Cambria Math" panose="02040503050406030204" pitchFamily="18" charset="0"/>
+                          </a:rPr>
+                          <m:t>[(</m:t>
+                        </m:r>
+                        <m:f>
+                          <m:fPr>
+                            <m:ctrlPr>
+                              <a:rPr lang="en-US" b="0" i="1" smtClean="0">
+                                <a:latin typeface="Cambria Math" panose="02040503050406030204" pitchFamily="18" charset="0"/>
+                                <a:ea typeface="Cambria Math" panose="02040503050406030204" pitchFamily="18" charset="0"/>
+                              </a:rPr>
+                            </m:ctrlPr>
+                          </m:fPr>
+                          <m:num>
+                            <m:r>
+                              <a:rPr lang="en-US" b="0" i="1" smtClean="0">
+                                <a:latin typeface="Cambria Math" panose="02040503050406030204" pitchFamily="18" charset="0"/>
+                                <a:ea typeface="Cambria Math" panose="02040503050406030204" pitchFamily="18" charset="0"/>
+                              </a:rPr>
+                              <m:t>2</m:t>
+                            </m:r>
+                            <m:r>
+                              <a:rPr lang="en-US" b="0" i="1" smtClean="0">
+                                <a:latin typeface="Cambria Math" panose="02040503050406030204" pitchFamily="18" charset="0"/>
+                                <a:ea typeface="Cambria Math" panose="02040503050406030204" pitchFamily="18" charset="0"/>
+                              </a:rPr>
+                              <m:t>𝜋</m:t>
+                            </m:r>
+                          </m:num>
+                          <m:den>
+                            <m:r>
+                              <a:rPr lang="en-US" b="0" i="1" smtClean="0">
+                                <a:latin typeface="Cambria Math" panose="02040503050406030204" pitchFamily="18" charset="0"/>
+                                <a:ea typeface="Cambria Math" panose="02040503050406030204" pitchFamily="18" charset="0"/>
+                              </a:rPr>
+                              <m:t>𝑁</m:t>
+                            </m:r>
+                          </m:den>
+                        </m:f>
+                        <m:r>
+                          <a:rPr lang="en-US" b="0" i="1" smtClean="0">
+                            <a:latin typeface="Cambria Math" panose="02040503050406030204" pitchFamily="18" charset="0"/>
+                            <a:ea typeface="Cambria Math" panose="02040503050406030204" pitchFamily="18" charset="0"/>
+                          </a:rPr>
+                          <m:t>𝑛</m:t>
+                        </m:r>
+                        <m:r>
+                          <a:rPr lang="en-US" b="0" i="1" smtClean="0">
+                            <a:latin typeface="Cambria Math" panose="02040503050406030204" pitchFamily="18" charset="0"/>
+                            <a:ea typeface="Cambria Math" panose="02040503050406030204" pitchFamily="18" charset="0"/>
+                          </a:rPr>
+                          <m:t>]</m:t>
+                        </m:r>
+                      </m:e>
+                    </m:func>
+                  </m:oMath>
+                </a14:m>
+                <a:endParaRPr lang="en-US" dirty="0"/>
+              </a:p>
+              <a:p>
+                <a:r>
+                  <a:rPr lang="en-US" dirty="0"/>
+                  <a:t>FFT:</a:t>
+                </a:r>
+              </a:p>
+              <a:p>
+                <a:pPr lvl="1"/>
+                <a14:m>
+                  <m:oMath xmlns:m="http://schemas.openxmlformats.org/officeDocument/2006/math">
+                    <m:r>
+                      <a:rPr lang="en-US" b="0" i="1" smtClean="0">
+                        <a:latin typeface="Cambria Math" panose="02040503050406030204" pitchFamily="18" charset="0"/>
+                      </a:rPr>
+                      <m:t>𝑓</m:t>
+                    </m:r>
+                    <m:d>
+                      <m:dPr>
+                        <m:begChr m:val="["/>
+                        <m:endChr m:val="]"/>
+                        <m:ctrlPr>
+                          <a:rPr lang="en-US" b="0" i="1" smtClean="0">
+                            <a:latin typeface="Cambria Math" panose="02040503050406030204" pitchFamily="18" charset="0"/>
+                          </a:rPr>
+                        </m:ctrlPr>
+                      </m:dPr>
+                      <m:e>
+                        <m:r>
+                          <a:rPr lang="en-US" b="0" i="1" smtClean="0">
+                            <a:latin typeface="Cambria Math" panose="02040503050406030204" pitchFamily="18" charset="0"/>
+                            <a:ea typeface="Cambria Math" panose="02040503050406030204" pitchFamily="18" charset="0"/>
+                          </a:rPr>
+                          <m:t>𝜔</m:t>
+                        </m:r>
+                      </m:e>
+                    </m:d>
+                    <m:r>
+                      <a:rPr lang="en-US" b="0" i="1" smtClean="0">
+                        <a:latin typeface="Cambria Math" panose="02040503050406030204" pitchFamily="18" charset="0"/>
+                      </a:rPr>
+                      <m:t>=</m:t>
+                    </m:r>
+                    <m:nary>
+                      <m:naryPr>
+                        <m:chr m:val="∑"/>
+                        <m:ctrlPr>
+                          <a:rPr lang="en-US" b="0" i="1" smtClean="0">
+                            <a:latin typeface="Cambria Math" panose="02040503050406030204" pitchFamily="18" charset="0"/>
+                          </a:rPr>
+                        </m:ctrlPr>
+                      </m:naryPr>
+                      <m:sub>
+                        <m:r>
+                          <m:rPr>
+                            <m:brk m:alnAt="23"/>
+                          </m:rPr>
+                          <a:rPr lang="en-US" b="0" i="1" smtClean="0">
+                            <a:latin typeface="Cambria Math" panose="02040503050406030204" pitchFamily="18" charset="0"/>
+                          </a:rPr>
+                          <m:t>𝑖</m:t>
+                        </m:r>
+                        <m:r>
+                          <a:rPr lang="en-US" b="0" i="1" smtClean="0">
+                            <a:latin typeface="Cambria Math" panose="02040503050406030204" pitchFamily="18" charset="0"/>
+                          </a:rPr>
+                          <m:t>=0</m:t>
+                        </m:r>
+                      </m:sub>
+                      <m:sup>
+                        <m:r>
+                          <a:rPr lang="en-US" b="0" i="1" smtClean="0">
+                            <a:latin typeface="Cambria Math" panose="02040503050406030204" pitchFamily="18" charset="0"/>
+                          </a:rPr>
+                          <m:t>𝑡</m:t>
+                        </m:r>
+                      </m:sup>
+                      <m:e>
+                        <m:r>
+                          <a:rPr lang="en-US" b="0" i="1" smtClean="0">
+                            <a:latin typeface="Cambria Math" panose="02040503050406030204" pitchFamily="18" charset="0"/>
+                          </a:rPr>
+                          <m:t>𝑓</m:t>
+                        </m:r>
+                        <m:d>
+                          <m:dPr>
+                            <m:begChr m:val="["/>
+                            <m:endChr m:val="]"/>
+                            <m:ctrlPr>
+                              <a:rPr lang="en-US" b="0" i="1" smtClean="0">
+                                <a:latin typeface="Cambria Math" panose="02040503050406030204" pitchFamily="18" charset="0"/>
+                              </a:rPr>
+                            </m:ctrlPr>
+                          </m:dPr>
+                          <m:e>
+                            <m:r>
+                              <a:rPr lang="en-US" b="0" i="1" smtClean="0">
+                                <a:latin typeface="Cambria Math" panose="02040503050406030204" pitchFamily="18" charset="0"/>
+                              </a:rPr>
+                              <m:t>𝑡</m:t>
+                            </m:r>
+                          </m:e>
+                        </m:d>
+                        <m:sSup>
+                          <m:sSupPr>
+                            <m:ctrlPr>
+                              <a:rPr lang="en-US" b="0" i="1" smtClean="0">
+                                <a:latin typeface="Cambria Math" panose="02040503050406030204" pitchFamily="18" charset="0"/>
+                              </a:rPr>
+                            </m:ctrlPr>
+                          </m:sSupPr>
+                          <m:e>
+                            <m:r>
+                              <a:rPr lang="en-US" b="0" i="1" smtClean="0">
+                                <a:latin typeface="Cambria Math" panose="02040503050406030204" pitchFamily="18" charset="0"/>
+                                <a:ea typeface="Cambria Math" panose="02040503050406030204" pitchFamily="18" charset="0"/>
+                              </a:rPr>
+                              <m:t>∙</m:t>
+                            </m:r>
+                            <m:r>
+                              <a:rPr lang="en-US" b="0" i="1" smtClean="0">
+                                <a:latin typeface="Cambria Math" panose="02040503050406030204" pitchFamily="18" charset="0"/>
+                              </a:rPr>
+                              <m:t>𝑒</m:t>
+                            </m:r>
+                          </m:e>
+                          <m:sup>
+                            <m:r>
+                              <a:rPr lang="en-US" b="0" i="1" smtClean="0">
+                                <a:latin typeface="Cambria Math" panose="02040503050406030204" pitchFamily="18" charset="0"/>
+                              </a:rPr>
+                              <m:t>−</m:t>
+                            </m:r>
+                            <m:r>
+                              <a:rPr lang="en-US" b="0" i="1" smtClean="0">
+                                <a:latin typeface="Cambria Math" panose="02040503050406030204" pitchFamily="18" charset="0"/>
+                              </a:rPr>
+                              <m:t>𝑖</m:t>
+                            </m:r>
+                            <m:r>
+                              <a:rPr lang="el-GR" b="0" i="1" smtClean="0">
+                                <a:latin typeface="Cambria Math" panose="02040503050406030204" pitchFamily="18" charset="0"/>
+                              </a:rPr>
+                              <m:t>𝜔</m:t>
+                            </m:r>
+                            <m:r>
+                              <a:rPr lang="en-US" b="0" i="1" smtClean="0">
+                                <a:latin typeface="Cambria Math" panose="02040503050406030204" pitchFamily="18" charset="0"/>
+                              </a:rPr>
+                              <m:t>𝑡</m:t>
+                            </m:r>
+                          </m:sup>
+                        </m:sSup>
+                      </m:e>
+                    </m:nary>
+                  </m:oMath>
+                </a14:m>
+                <a:endParaRPr lang="en-US" dirty="0"/>
+              </a:p>
+              <a:p>
+                <a:r>
+                  <a:rPr lang="en-US" dirty="0"/>
+                  <a:t>Mel-Scale:</a:t>
+                </a:r>
+              </a:p>
+              <a:p>
+                <a:pPr lvl="1"/>
+                <a14:m>
+                  <m:oMath xmlns:m="http://schemas.openxmlformats.org/officeDocument/2006/math">
+                    <m:func>
+                      <m:funcPr>
+                        <m:ctrlPr>
+                          <a:rPr lang="en-US" i="1" smtClean="0">
+                            <a:latin typeface="Cambria Math" panose="02040503050406030204" pitchFamily="18" charset="0"/>
+                          </a:rPr>
+                        </m:ctrlPr>
+                      </m:funcPr>
+                      <m:fName>
+                        <m:r>
+                          <a:rPr lang="en-US" b="0" i="1" smtClean="0">
+                            <a:latin typeface="Cambria Math" panose="02040503050406030204" pitchFamily="18" charset="0"/>
+                          </a:rPr>
+                          <m:t>𝑚</m:t>
+                        </m:r>
+                        <m:d>
+                          <m:dPr>
+                            <m:begChr m:val="["/>
+                            <m:endChr m:val="]"/>
+                            <m:ctrlPr>
+                              <a:rPr lang="en-US" b="0" i="1" smtClean="0">
+                                <a:latin typeface="Cambria Math" panose="02040503050406030204" pitchFamily="18" charset="0"/>
+                              </a:rPr>
+                            </m:ctrlPr>
+                          </m:dPr>
+                          <m:e>
+                            <m:r>
+                              <a:rPr lang="en-US" b="0" i="1" smtClean="0">
+                                <a:latin typeface="Cambria Math" panose="02040503050406030204" pitchFamily="18" charset="0"/>
+                              </a:rPr>
+                              <m:t>𝑓</m:t>
+                            </m:r>
+                          </m:e>
+                        </m:d>
+                        <m:r>
+                          <a:rPr lang="en-US" b="0" i="1" smtClean="0">
+                            <a:latin typeface="Cambria Math" panose="02040503050406030204" pitchFamily="18" charset="0"/>
+                          </a:rPr>
+                          <m:t>= </m:t>
+                        </m:r>
+                        <m:sSub>
+                          <m:sSubPr>
+                            <m:ctrlPr>
+                              <a:rPr lang="en-US" i="1" smtClean="0">
+                                <a:latin typeface="Cambria Math" panose="02040503050406030204" pitchFamily="18" charset="0"/>
+                              </a:rPr>
+                            </m:ctrlPr>
+                          </m:sSubPr>
+                          <m:e>
+                            <m:r>
+                              <a:rPr lang="en-US" b="0" i="0" smtClean="0">
+                                <a:latin typeface="Cambria Math" panose="02040503050406030204" pitchFamily="18" charset="0"/>
+                              </a:rPr>
+                              <m:t>2595</m:t>
+                            </m:r>
+                            <m:r>
+                              <m:rPr>
+                                <m:sty m:val="p"/>
+                              </m:rPr>
+                              <a:rPr lang="en-US" i="0" smtClean="0">
+                                <a:latin typeface="Cambria Math" panose="02040503050406030204" pitchFamily="18" charset="0"/>
+                              </a:rPr>
+                              <m:t>log</m:t>
+                            </m:r>
+                          </m:e>
+                          <m:sub>
+                            <m:r>
+                              <a:rPr lang="en-US" b="0" i="1" smtClean="0">
+                                <a:latin typeface="Cambria Math" panose="02040503050406030204" pitchFamily="18" charset="0"/>
+                              </a:rPr>
+                              <m:t>10</m:t>
+                            </m:r>
+                          </m:sub>
+                        </m:sSub>
+                      </m:fName>
+                      <m:e>
+                        <m:d>
+                          <m:dPr>
+                            <m:ctrlPr>
+                              <a:rPr lang="en-US" i="1" smtClean="0">
+                                <a:latin typeface="Cambria Math" panose="02040503050406030204" pitchFamily="18" charset="0"/>
+                              </a:rPr>
+                            </m:ctrlPr>
+                          </m:dPr>
+                          <m:e>
+                            <m:r>
+                              <a:rPr lang="en-US" b="0" i="1" smtClean="0">
+                                <a:latin typeface="Cambria Math" panose="02040503050406030204" pitchFamily="18" charset="0"/>
+                              </a:rPr>
+                              <m:t>1+ </m:t>
+                            </m:r>
+                            <m:f>
+                              <m:fPr>
+                                <m:ctrlPr>
+                                  <a:rPr lang="en-US" b="0" i="1" smtClean="0">
+                                    <a:latin typeface="Cambria Math" panose="02040503050406030204" pitchFamily="18" charset="0"/>
+                                  </a:rPr>
+                                </m:ctrlPr>
+                              </m:fPr>
+                              <m:num>
+                                <m:r>
+                                  <a:rPr lang="en-US" b="0" i="1" smtClean="0">
+                                    <a:latin typeface="Cambria Math" panose="02040503050406030204" pitchFamily="18" charset="0"/>
+                                  </a:rPr>
+                                  <m:t>𝑓</m:t>
+                                </m:r>
+                              </m:num>
+                              <m:den>
+                                <m:r>
+                                  <a:rPr lang="en-US" b="0" i="1" smtClean="0">
+                                    <a:latin typeface="Cambria Math" panose="02040503050406030204" pitchFamily="18" charset="0"/>
+                                  </a:rPr>
+                                  <m:t>7000</m:t>
+                                </m:r>
+                              </m:den>
+                            </m:f>
+                          </m:e>
+                        </m:d>
+                      </m:e>
+                    </m:func>
+                  </m:oMath>
+                </a14:m>
+                <a:endParaRPr lang="en-US" dirty="0"/>
+              </a:p>
+              <a:p>
+                <a:pPr marL="457200" lvl="1" indent="0">
+                  <a:buNone/>
+                </a:pPr>
+                <a:endParaRPr lang="en-US" dirty="0"/>
+              </a:p>
+            </p:txBody>
+          </p:sp>
+        </mc:Choice>
+        <mc:Fallback>
+          <p:sp>
+            <p:nvSpPr>
+              <p:cNvPr id="5" name="Content Placeholder 4">
+                <a:extLst>
+                  <a:ext uri="{FF2B5EF4-FFF2-40B4-BE49-F238E27FC236}">
+                    <a16:creationId xmlns:a16="http://schemas.microsoft.com/office/drawing/2014/main" id="{B9A1EEB0-49B2-4EC9-966E-AB791CE89C99}"/>
+                  </a:ext>
+                </a:extLst>
+              </p:cNvPr>
+              <p:cNvSpPr>
+                <a:spLocks noGrp="1" noRot="1" noChangeAspect="1" noMove="1" noResize="1" noEditPoints="1" noAdjustHandles="1" noChangeArrowheads="1" noChangeShapeType="1" noTextEdit="1"/>
+              </p:cNvSpPr>
+              <p:nvPr>
+                <p:ph sz="half" idx="2"/>
+              </p:nvPr>
+            </p:nvSpPr>
+            <p:spPr>
+              <a:blipFill>
+                <a:blip r:embed="rId3"/>
+                <a:stretch>
+                  <a:fillRect l="-1882" t="-2801"/>
+                </a:stretch>
+              </a:blipFill>
+            </p:spPr>
+            <p:txBody>
+              <a:bodyPr/>
+              <a:lstStyle/>
+              <a:p>
+                <a:r>
+                  <a:rPr lang="en-US">
+                    <a:noFill/>
+                  </a:rPr>
+                  <a:t> </a:t>
+                </a:r>
+              </a:p>
+            </p:txBody>
+          </p:sp>
+        </mc:Fallback>
+      </mc:AlternateContent>
+    </p:spTree>
+    <p:extLst>
+      <p:ext uri="{BB962C8B-B14F-4D97-AF65-F5344CB8AC3E}">
+        <p14:creationId xmlns:p14="http://schemas.microsoft.com/office/powerpoint/2010/main" val="2675239192"/>
+      </p:ext>
+    </p:extLst>
+  </p:cSld>
+  <p:clrMapOvr>
+    <a:masterClrMapping/>
+  </p:clrMapOvr>
+</p:sld>
+</file>
+
+<file path=ppt/slides/slide6.xml><?xml version="1.0" encoding="utf-8"?>
+<p:sld xmlns:a="http://schemas.openxmlformats.org/drawingml/2006/main" xmlns:r="http://schemas.openxmlformats.org/officeDocument/2006/relationships" xmlns:p="http://schemas.openxmlformats.org/presentationml/2006/main">
+  <p:cSld>
+    <p:spTree>
+      <p:nvGrpSpPr>
+        <p:cNvPr id="1" name=""/>
+        <p:cNvGrpSpPr/>
+        <p:nvPr/>
+      </p:nvGrpSpPr>
+      <p:grpSpPr>
+        <a:xfrm>
+          <a:off x="0" y="0"/>
+          <a:ext cx="0" cy="0"/>
+          <a:chOff x="0" y="0"/>
+          <a:chExt cx="0" cy="0"/>
+        </a:xfrm>
+      </p:grpSpPr>
+      <p:sp>
+        <p:nvSpPr>
+          <p:cNvPr id="2" name="Title 1">
+            <a:extLst>
+              <a:ext uri="{FF2B5EF4-FFF2-40B4-BE49-F238E27FC236}">
+                <a16:creationId xmlns:a16="http://schemas.microsoft.com/office/drawing/2014/main" id="{16E45FD4-5ED1-4E6C-B2BE-70DDFFDDA079}"/>
+              </a:ext>
+            </a:extLst>
+          </p:cNvPr>
+          <p:cNvSpPr>
+            <a:spLocks noGrp="1"/>
+          </p:cNvSpPr>
+          <p:nvPr>
+            <p:ph type="title"/>
+          </p:nvPr>
+        </p:nvSpPr>
+        <p:spPr/>
+        <p:txBody>
+          <a:bodyPr/>
+          <a:lstStyle/>
+          <a:p>
+            <a:r>
+              <a:rPr lang="en-US" dirty="0" err="1"/>
+              <a:t>ResNet</a:t>
+            </a:r>
+            <a:r>
+              <a:rPr lang="en-US" dirty="0"/>
+              <a:t> Architecture</a:t>
+            </a:r>
+          </a:p>
+        </p:txBody>
+      </p:sp>
+      <p:sp>
+        <p:nvSpPr>
+          <p:cNvPr id="5" name="Text Placeholder 4">
+            <a:extLst>
+              <a:ext uri="{FF2B5EF4-FFF2-40B4-BE49-F238E27FC236}">
+                <a16:creationId xmlns:a16="http://schemas.microsoft.com/office/drawing/2014/main" id="{243CCD26-6C28-4DA0-8692-A3FD7E8AABF1}"/>
+              </a:ext>
+            </a:extLst>
+          </p:cNvPr>
+          <p:cNvSpPr>
+            <a:spLocks noGrp="1"/>
+          </p:cNvSpPr>
+          <p:nvPr>
+            <p:ph type="body" idx="1"/>
+          </p:nvPr>
+        </p:nvSpPr>
+        <p:spPr/>
+        <p:txBody>
+          <a:bodyPr/>
+          <a:lstStyle/>
+          <a:p>
+            <a:r>
+              <a:rPr lang="en-US" dirty="0"/>
+              <a:t>Resnet Block</a:t>
+            </a:r>
+          </a:p>
+        </p:txBody>
+      </p:sp>
+      <p:sp>
+        <p:nvSpPr>
+          <p:cNvPr id="6" name="Text Placeholder 5">
+            <a:extLst>
+              <a:ext uri="{FF2B5EF4-FFF2-40B4-BE49-F238E27FC236}">
+                <a16:creationId xmlns:a16="http://schemas.microsoft.com/office/drawing/2014/main" id="{7C0D8B6C-A478-41CC-BAF5-3841EA0E038C}"/>
+              </a:ext>
+            </a:extLst>
+          </p:cNvPr>
+          <p:cNvSpPr>
+            <a:spLocks noGrp="1"/>
+          </p:cNvSpPr>
+          <p:nvPr>
+            <p:ph type="body" sz="quarter" idx="3"/>
+          </p:nvPr>
+        </p:nvSpPr>
+        <p:spPr/>
+        <p:txBody>
+          <a:bodyPr/>
+          <a:lstStyle/>
+          <a:p>
+            <a:r>
+              <a:rPr lang="en-US" dirty="0"/>
+              <a:t>Explanation</a:t>
+            </a:r>
+          </a:p>
+        </p:txBody>
+      </p:sp>
+      <p:sp>
+        <p:nvSpPr>
+          <p:cNvPr id="7" name="Content Placeholder 6">
+            <a:extLst>
+              <a:ext uri="{FF2B5EF4-FFF2-40B4-BE49-F238E27FC236}">
+                <a16:creationId xmlns:a16="http://schemas.microsoft.com/office/drawing/2014/main" id="{0A1FEDB9-8263-47A7-A62E-6721A3F366DC}"/>
+              </a:ext>
+            </a:extLst>
+          </p:cNvPr>
+          <p:cNvSpPr>
+            <a:spLocks noGrp="1"/>
+          </p:cNvSpPr>
+          <p:nvPr>
+            <p:ph sz="quarter" idx="4"/>
+          </p:nvPr>
+        </p:nvSpPr>
+        <p:spPr/>
+        <p:txBody>
+          <a:bodyPr/>
+          <a:lstStyle/>
+          <a:p>
+            <a:r>
+              <a:rPr lang="en-US" dirty="0"/>
+              <a:t>Input enters standard convolution</a:t>
+            </a:r>
+          </a:p>
+          <a:p>
+            <a:r>
+              <a:rPr lang="en-US" dirty="0"/>
+              <a:t>Second convolution performed on first convolution</a:t>
+            </a:r>
+          </a:p>
+          <a:p>
+            <a:r>
+              <a:rPr lang="en-US" dirty="0"/>
+              <a:t>Results of both convolutions combined</a:t>
+            </a:r>
+          </a:p>
+          <a:p>
+            <a:r>
+              <a:rPr lang="en-US" dirty="0"/>
+              <a:t>Additional activation passes to next block</a:t>
+            </a:r>
+          </a:p>
+        </p:txBody>
+      </p:sp>
+      <p:pic>
+        <p:nvPicPr>
+          <p:cNvPr id="10" name="Content Placeholder 9">
+            <a:extLst>
+              <a:ext uri="{FF2B5EF4-FFF2-40B4-BE49-F238E27FC236}">
+                <a16:creationId xmlns:a16="http://schemas.microsoft.com/office/drawing/2014/main" id="{F681C245-75E1-42D0-B722-105F52AE7DA3}"/>
+              </a:ext>
+            </a:extLst>
+          </p:cNvPr>
+          <p:cNvPicPr>
+            <a:picLocks noGrp="1" noChangeAspect="1"/>
+          </p:cNvPicPr>
+          <p:nvPr>
+            <p:ph sz="half" idx="2"/>
+          </p:nvPr>
+        </p:nvPicPr>
+        <p:blipFill>
+          <a:blip r:embed="rId2"/>
+          <a:stretch>
+            <a:fillRect/>
+          </a:stretch>
+        </p:blipFill>
+        <p:spPr>
+          <a:xfrm>
+            <a:off x="839788" y="2941656"/>
+            <a:ext cx="5157787" cy="1089222"/>
+          </a:xfrm>
+          <a:prstGeom prst="rect">
+            <a:avLst/>
+          </a:prstGeom>
+        </p:spPr>
+      </p:pic>
+    </p:spTree>
+    <p:extLst>
+      <p:ext uri="{BB962C8B-B14F-4D97-AF65-F5344CB8AC3E}">
+        <p14:creationId xmlns:p14="http://schemas.microsoft.com/office/powerpoint/2010/main" val="202815015"/>
+      </p:ext>
+    </p:extLst>
+  </p:cSld>
+  <p:clrMapOvr>
+    <a:masterClrMapping/>
+  </p:clrMapOvr>
+</p:sld>
+</file>
+
+<file path=ppt/slides/slide7.xml><?xml version="1.0" encoding="utf-8"?>
+<p:sld xmlns:a="http://schemas.openxmlformats.org/drawingml/2006/main" xmlns:r="http://schemas.openxmlformats.org/officeDocument/2006/relationships" xmlns:p="http://schemas.openxmlformats.org/presentationml/2006/main">
+  <p:cSld>
+    <p:spTree>
+      <p:nvGrpSpPr>
+        <p:cNvPr id="1" name=""/>
+        <p:cNvGrpSpPr/>
+        <p:nvPr/>
+      </p:nvGrpSpPr>
+      <p:grpSpPr>
+        <a:xfrm>
+          <a:off x="0" y="0"/>
+          <a:ext cx="0" cy="0"/>
+          <a:chOff x="0" y="0"/>
+          <a:chExt cx="0" cy="0"/>
+        </a:xfrm>
+      </p:grpSpPr>
+      <p:sp>
+        <p:nvSpPr>
+          <p:cNvPr id="2" name="Title 1">
+            <a:extLst>
+              <a:ext uri="{FF2B5EF4-FFF2-40B4-BE49-F238E27FC236}">
+                <a16:creationId xmlns:a16="http://schemas.microsoft.com/office/drawing/2014/main" id="{4D0A5BD2-B87F-4D7C-809F-04261CB55168}"/>
+              </a:ext>
+            </a:extLst>
+          </p:cNvPr>
+          <p:cNvSpPr>
+            <a:spLocks noGrp="1"/>
+          </p:cNvSpPr>
+          <p:nvPr>
+            <p:ph type="title"/>
+          </p:nvPr>
+        </p:nvSpPr>
+        <p:spPr/>
+        <p:txBody>
+          <a:bodyPr/>
+          <a:lstStyle/>
+          <a:p>
+            <a:r>
+              <a:rPr lang="en-US" dirty="0"/>
+              <a:t>Self-Attention Layer</a:t>
+            </a:r>
+          </a:p>
+        </p:txBody>
+      </p:sp>
+      <p:pic>
+        <p:nvPicPr>
+          <p:cNvPr id="6" name="Content Placeholder 5">
+            <a:extLst>
+              <a:ext uri="{FF2B5EF4-FFF2-40B4-BE49-F238E27FC236}">
+                <a16:creationId xmlns:a16="http://schemas.microsoft.com/office/drawing/2014/main" id="{D8B87AFB-1F25-4D75-8537-CA50BE3C90FA}"/>
+              </a:ext>
+            </a:extLst>
+          </p:cNvPr>
+          <p:cNvPicPr>
+            <a:picLocks noGrp="1" noChangeAspect="1"/>
+          </p:cNvPicPr>
+          <p:nvPr>
+            <p:ph sz="half" idx="1"/>
+          </p:nvPr>
+        </p:nvPicPr>
+        <p:blipFill>
+          <a:blip r:embed="rId2"/>
+          <a:stretch>
+            <a:fillRect/>
+          </a:stretch>
+        </p:blipFill>
+        <p:spPr>
+          <a:xfrm>
+            <a:off x="838200" y="1825625"/>
+            <a:ext cx="5181600" cy="1237870"/>
+          </a:xfrm>
+          <a:prstGeom prst="rect">
+            <a:avLst/>
+          </a:prstGeom>
+        </p:spPr>
+      </p:pic>
+      <mc:AlternateContent xmlns:mc="http://schemas.openxmlformats.org/markup-compatibility/2006">
+        <mc:Choice xmlns:a14="http://schemas.microsoft.com/office/drawing/2010/main" Requires="a14">
+          <p:sp>
+            <p:nvSpPr>
+              <p:cNvPr id="5" name="Content Placeholder 4">
+                <a:extLst>
+                  <a:ext uri="{FF2B5EF4-FFF2-40B4-BE49-F238E27FC236}">
+                    <a16:creationId xmlns:a16="http://schemas.microsoft.com/office/drawing/2014/main" id="{F33B89D5-3A82-408F-97A1-CDBE8DD691FD}"/>
+                  </a:ext>
+                </a:extLst>
+              </p:cNvPr>
+              <p:cNvSpPr>
+                <a:spLocks noGrp="1"/>
+              </p:cNvSpPr>
+              <p:nvPr>
+                <p:ph sz="half" idx="2"/>
+              </p:nvPr>
+            </p:nvSpPr>
+            <p:spPr/>
+            <p:txBody>
+              <a:bodyPr/>
+              <a:lstStyle/>
+              <a:p>
+                <a:r>
+                  <a:rPr lang="en-US" dirty="0"/>
+                  <a:t>Computes annotation matrix</a:t>
+                </a:r>
+              </a:p>
+              <a:p>
+                <a:pPr lvl="1"/>
+                <a14:m>
+                  <m:oMath xmlns:m="http://schemas.openxmlformats.org/officeDocument/2006/math">
+                    <m:r>
+                      <a:rPr lang="en-US" b="0" i="1" smtClean="0">
+                        <a:latin typeface="Cambria Math" panose="02040503050406030204" pitchFamily="18" charset="0"/>
+                      </a:rPr>
+                      <m:t>𝐴</m:t>
+                    </m:r>
+                    <m:r>
+                      <a:rPr lang="en-US" b="0" i="1" smtClean="0">
+                        <a:latin typeface="Cambria Math" panose="02040503050406030204" pitchFamily="18" charset="0"/>
+                      </a:rPr>
+                      <m:t>=</m:t>
+                    </m:r>
+                    <m:r>
+                      <a:rPr lang="en-US" b="0" i="1" smtClean="0">
+                        <a:latin typeface="Cambria Math" panose="02040503050406030204" pitchFamily="18" charset="0"/>
+                      </a:rPr>
+                      <m:t>𝑠𝑜𝑓𝑡𝑚𝑎𝑥</m:t>
+                    </m:r>
+                    <m:r>
+                      <a:rPr lang="en-US" b="0" i="1" smtClean="0">
+                        <a:latin typeface="Cambria Math" panose="02040503050406030204" pitchFamily="18" charset="0"/>
+                      </a:rPr>
+                      <m:t>(</m:t>
+                    </m:r>
+                    <m:r>
+                      <m:rPr>
+                        <m:sty m:val="p"/>
+                      </m:rPr>
+                      <a:rPr lang="en-US" b="0" i="0" smtClean="0">
+                        <a:latin typeface="Cambria Math" panose="02040503050406030204" pitchFamily="18" charset="0"/>
+                      </a:rPr>
+                      <m:t>tanh</m:t>
+                    </m:r>
+                    <m:r>
+                      <a:rPr lang="en-US" b="0" i="1" smtClean="0">
+                        <a:latin typeface="Cambria Math" panose="02040503050406030204" pitchFamily="18" charset="0"/>
+                      </a:rPr>
+                      <m:t>⁡(</m:t>
+                    </m:r>
+                    <m:r>
+                      <a:rPr lang="en-US" b="0" i="1" smtClean="0">
+                        <a:latin typeface="Cambria Math" panose="02040503050406030204" pitchFamily="18" charset="0"/>
+                      </a:rPr>
+                      <m:t>𝐻</m:t>
+                    </m:r>
+                    <m:sSub>
+                      <m:sSubPr>
+                        <m:ctrlPr>
+                          <a:rPr lang="en-US" b="0" i="1" smtClean="0">
+                            <a:latin typeface="Cambria Math" panose="02040503050406030204" pitchFamily="18" charset="0"/>
+                          </a:rPr>
+                        </m:ctrlPr>
+                      </m:sSubPr>
+                      <m:e>
+                        <m:r>
+                          <a:rPr lang="en-US" b="0" i="1" smtClean="0">
+                            <a:latin typeface="Cambria Math" panose="02040503050406030204" pitchFamily="18" charset="0"/>
+                          </a:rPr>
+                          <m:t>𝑊</m:t>
+                        </m:r>
+                      </m:e>
+                      <m:sub>
+                        <m:r>
+                          <a:rPr lang="en-US" b="0" i="1" smtClean="0">
+                            <a:latin typeface="Cambria Math" panose="02040503050406030204" pitchFamily="18" charset="0"/>
+                          </a:rPr>
+                          <m:t>1</m:t>
+                        </m:r>
+                      </m:sub>
+                    </m:sSub>
+                    <m:r>
+                      <a:rPr lang="en-US" b="0" i="1" smtClean="0">
+                        <a:latin typeface="Cambria Math" panose="02040503050406030204" pitchFamily="18" charset="0"/>
+                      </a:rPr>
+                      <m:t>)</m:t>
+                    </m:r>
+                    <m:sSub>
+                      <m:sSubPr>
+                        <m:ctrlPr>
+                          <a:rPr lang="en-US" b="0" i="1" smtClean="0">
+                            <a:latin typeface="Cambria Math" panose="02040503050406030204" pitchFamily="18" charset="0"/>
+                          </a:rPr>
+                        </m:ctrlPr>
+                      </m:sSubPr>
+                      <m:e>
+                        <m:r>
+                          <a:rPr lang="en-US" b="0" i="1" smtClean="0">
+                            <a:latin typeface="Cambria Math" panose="02040503050406030204" pitchFamily="18" charset="0"/>
+                          </a:rPr>
+                          <m:t>𝑊</m:t>
+                        </m:r>
+                      </m:e>
+                      <m:sub>
+                        <m:r>
+                          <a:rPr lang="en-US" b="0" i="1" smtClean="0">
+                            <a:latin typeface="Cambria Math" panose="02040503050406030204" pitchFamily="18" charset="0"/>
+                          </a:rPr>
+                          <m:t>2</m:t>
+                        </m:r>
+                      </m:sub>
+                    </m:sSub>
+                  </m:oMath>
+                </a14:m>
+                <a:endParaRPr lang="en-US" dirty="0"/>
+              </a:p>
+              <a:p>
+                <a14:m>
+                  <m:oMath xmlns:m="http://schemas.openxmlformats.org/officeDocument/2006/math">
+                    <m:sSub>
+                      <m:sSubPr>
+                        <m:ctrlPr>
+                          <a:rPr lang="en-US" i="1" smtClean="0">
+                            <a:latin typeface="Cambria Math" panose="02040503050406030204" pitchFamily="18" charset="0"/>
+                          </a:rPr>
+                        </m:ctrlPr>
+                      </m:sSubPr>
+                      <m:e>
+                        <m:r>
+                          <a:rPr lang="en-US" b="0" i="1" smtClean="0">
+                            <a:latin typeface="Cambria Math" panose="02040503050406030204" pitchFamily="18" charset="0"/>
+                          </a:rPr>
+                          <m:t>𝑛</m:t>
+                        </m:r>
+                      </m:e>
+                      <m:sub>
+                        <m:r>
+                          <a:rPr lang="en-US" b="0" i="1" smtClean="0">
+                            <a:latin typeface="Cambria Math" panose="02040503050406030204" pitchFamily="18" charset="0"/>
+                          </a:rPr>
+                          <m:t>𝑘</m:t>
+                        </m:r>
+                      </m:sub>
+                    </m:sSub>
+                  </m:oMath>
+                </a14:m>
+                <a:r>
+                  <a:rPr lang="en-US" dirty="0"/>
+                  <a:t> encodes for number of attention hops</a:t>
+                </a:r>
+              </a:p>
+              <a:p>
+                <a:r>
+                  <a:rPr lang="en-US" dirty="0"/>
+                  <a:t>Requires penalization term to moderate </a:t>
+                </a:r>
+                <a14:m>
+                  <m:oMath xmlns:m="http://schemas.openxmlformats.org/officeDocument/2006/math">
+                    <m:sSub>
+                      <m:sSubPr>
+                        <m:ctrlPr>
+                          <a:rPr lang="en-US" i="1" smtClean="0">
+                            <a:latin typeface="Cambria Math" panose="02040503050406030204" pitchFamily="18" charset="0"/>
+                          </a:rPr>
+                        </m:ctrlPr>
+                      </m:sSubPr>
+                      <m:e>
+                        <m:r>
+                          <a:rPr lang="en-US" b="0" i="1" smtClean="0">
+                            <a:latin typeface="Cambria Math" panose="02040503050406030204" pitchFamily="18" charset="0"/>
+                          </a:rPr>
+                          <m:t>𝑛</m:t>
+                        </m:r>
+                      </m:e>
+                      <m:sub>
+                        <m:r>
+                          <a:rPr lang="en-US" b="0" i="1" smtClean="0">
+                            <a:latin typeface="Cambria Math" panose="02040503050406030204" pitchFamily="18" charset="0"/>
+                          </a:rPr>
+                          <m:t>𝑘</m:t>
+                        </m:r>
+                      </m:sub>
+                    </m:sSub>
+                  </m:oMath>
+                </a14:m>
+                <a:r>
+                  <a:rPr lang="en-US" dirty="0"/>
+                  <a:t> on loss function</a:t>
+                </a:r>
+              </a:p>
+              <a:p>
+                <a:pPr lvl="1"/>
+                <a14:m>
+                  <m:oMath xmlns:m="http://schemas.openxmlformats.org/officeDocument/2006/math">
+                    <m:sSub>
+                      <m:sSubPr>
+                        <m:ctrlPr>
+                          <a:rPr lang="en-US" i="1" smtClean="0">
+                            <a:latin typeface="Cambria Math" panose="02040503050406030204" pitchFamily="18" charset="0"/>
+                          </a:rPr>
+                        </m:ctrlPr>
+                      </m:sSubPr>
+                      <m:e>
+                        <m:r>
+                          <a:rPr lang="en-US" b="0" i="1" smtClean="0">
+                            <a:latin typeface="Cambria Math" panose="02040503050406030204" pitchFamily="18" charset="0"/>
+                          </a:rPr>
+                          <m:t>𝐼</m:t>
+                        </m:r>
+                      </m:e>
+                      <m:sub>
+                        <m:r>
+                          <a:rPr lang="en-US" b="0" i="1" smtClean="0">
+                            <a:latin typeface="Cambria Math" panose="02040503050406030204" pitchFamily="18" charset="0"/>
+                          </a:rPr>
+                          <m:t>𝑝</m:t>
+                        </m:r>
+                      </m:sub>
+                    </m:sSub>
+                    <m:r>
+                      <a:rPr lang="en-US" b="0" i="1" smtClean="0">
+                        <a:latin typeface="Cambria Math" panose="02040503050406030204" pitchFamily="18" charset="0"/>
+                      </a:rPr>
+                      <m:t>= </m:t>
+                    </m:r>
+                    <m:r>
+                      <a:rPr lang="en-US" b="0" i="1" smtClean="0">
+                        <a:latin typeface="Cambria Math" panose="02040503050406030204" pitchFamily="18" charset="0"/>
+                        <a:ea typeface="Cambria Math" panose="02040503050406030204" pitchFamily="18" charset="0"/>
+                      </a:rPr>
+                      <m:t>𝛽</m:t>
+                    </m:r>
+                    <m:d>
+                      <m:dPr>
+                        <m:begChr m:val="‖"/>
+                        <m:endChr m:val="‖"/>
+                        <m:ctrlPr>
+                          <a:rPr lang="en-US" b="0" i="1" smtClean="0">
+                            <a:latin typeface="Cambria Math" panose="02040503050406030204" pitchFamily="18" charset="0"/>
+                            <a:ea typeface="Cambria Math" panose="02040503050406030204" pitchFamily="18" charset="0"/>
+                          </a:rPr>
+                        </m:ctrlPr>
+                      </m:dPr>
+                      <m:e>
+                        <m:d>
+                          <m:dPr>
+                            <m:begChr m:val="|"/>
+                            <m:endChr m:val="|"/>
+                            <m:ctrlPr>
+                              <a:rPr lang="en-US" b="0" i="1" smtClean="0">
+                                <a:latin typeface="Cambria Math" panose="02040503050406030204" pitchFamily="18" charset="0"/>
+                                <a:ea typeface="Cambria Math" panose="02040503050406030204" pitchFamily="18" charset="0"/>
+                              </a:rPr>
+                            </m:ctrlPr>
+                          </m:dPr>
+                          <m:e>
+                            <m:sSup>
+                              <m:sSupPr>
+                                <m:ctrlPr>
+                                  <a:rPr lang="en-US" b="0" i="1" smtClean="0">
+                                    <a:latin typeface="Cambria Math" panose="02040503050406030204" pitchFamily="18" charset="0"/>
+                                    <a:ea typeface="Cambria Math" panose="02040503050406030204" pitchFamily="18" charset="0"/>
+                                  </a:rPr>
+                                </m:ctrlPr>
+                              </m:sSupPr>
+                              <m:e>
+                                <m:r>
+                                  <a:rPr lang="en-US" b="0" i="1" smtClean="0">
+                                    <a:latin typeface="Cambria Math" panose="02040503050406030204" pitchFamily="18" charset="0"/>
+                                    <a:ea typeface="Cambria Math" panose="02040503050406030204" pitchFamily="18" charset="0"/>
+                                  </a:rPr>
+                                  <m:t>𝐴</m:t>
+                                </m:r>
+                              </m:e>
+                              <m:sup>
+                                <m:r>
+                                  <a:rPr lang="en-US" b="0" i="1" smtClean="0">
+                                    <a:latin typeface="Cambria Math" panose="02040503050406030204" pitchFamily="18" charset="0"/>
+                                    <a:ea typeface="Cambria Math" panose="02040503050406030204" pitchFamily="18" charset="0"/>
+                                  </a:rPr>
+                                  <m:t>𝑇</m:t>
+                                </m:r>
+                              </m:sup>
+                            </m:sSup>
+                            <m:r>
+                              <a:rPr lang="en-US" b="0" i="1" smtClean="0">
+                                <a:latin typeface="Cambria Math" panose="02040503050406030204" pitchFamily="18" charset="0"/>
+                                <a:ea typeface="Cambria Math" panose="02040503050406030204" pitchFamily="18" charset="0"/>
+                              </a:rPr>
+                              <m:t>𝐴</m:t>
+                            </m:r>
+                            <m:r>
+                              <a:rPr lang="en-US" b="0" i="1" smtClean="0">
+                                <a:latin typeface="Cambria Math" panose="02040503050406030204" pitchFamily="18" charset="0"/>
+                                <a:ea typeface="Cambria Math" panose="02040503050406030204" pitchFamily="18" charset="0"/>
+                              </a:rPr>
+                              <m:t> −</m:t>
+                            </m:r>
+                            <m:r>
+                              <a:rPr lang="en-US" b="0" i="1" smtClean="0">
+                                <a:latin typeface="Cambria Math" panose="02040503050406030204" pitchFamily="18" charset="0"/>
+                                <a:ea typeface="Cambria Math" panose="02040503050406030204" pitchFamily="18" charset="0"/>
+                              </a:rPr>
+                              <m:t>𝐼</m:t>
+                            </m:r>
+                          </m:e>
+                        </m:d>
+                      </m:e>
+                    </m:d>
+                    <m:sPre>
+                      <m:sPrePr>
+                        <m:ctrlPr>
+                          <a:rPr lang="en-US" b="0" i="1" smtClean="0">
+                            <a:latin typeface="Cambria Math" panose="02040503050406030204" pitchFamily="18" charset="0"/>
+                            <a:ea typeface="Cambria Math" panose="02040503050406030204" pitchFamily="18" charset="0"/>
+                          </a:rPr>
+                        </m:ctrlPr>
+                      </m:sPrePr>
+                      <m:sub>
+                        <m:r>
+                          <a:rPr lang="en-US" b="0" i="1" smtClean="0">
+                            <a:latin typeface="Cambria Math" panose="02040503050406030204" pitchFamily="18" charset="0"/>
+                            <a:ea typeface="Cambria Math" panose="02040503050406030204" pitchFamily="18" charset="0"/>
+                          </a:rPr>
+                          <m:t>𝐹</m:t>
+                        </m:r>
+                      </m:sub>
+                      <m:sup>
+                        <m:r>
+                          <a:rPr lang="en-US" b="0" i="1" smtClean="0">
+                            <a:latin typeface="Cambria Math" panose="02040503050406030204" pitchFamily="18" charset="0"/>
+                          </a:rPr>
+                          <m:t>2</m:t>
+                        </m:r>
+                      </m:sup>
+                      <m:e>
+                        <m:r>
+                          <a:rPr lang="en-US" b="0" i="1" smtClean="0">
+                            <a:latin typeface="Cambria Math" panose="02040503050406030204" pitchFamily="18" charset="0"/>
+                          </a:rPr>
+                          <m:t> </m:t>
+                        </m:r>
+                      </m:e>
+                    </m:sPre>
+                  </m:oMath>
+                </a14:m>
+                <a:endParaRPr lang="en-US" dirty="0"/>
+              </a:p>
+              <a:p>
+                <a:pPr lvl="1"/>
+                <a:r>
+                  <a:rPr lang="en-US" dirty="0" err="1"/>
+                  <a:t>Frobenius</a:t>
+                </a:r>
+                <a:r>
+                  <a:rPr lang="en-US" dirty="0"/>
+                  <a:t> norm </a:t>
+                </a:r>
+                <a14:m>
+                  <m:oMath xmlns:m="http://schemas.openxmlformats.org/officeDocument/2006/math">
+                    <m:rad>
+                      <m:radPr>
+                        <m:degHide m:val="on"/>
+                        <m:ctrlPr>
+                          <a:rPr lang="en-US" i="1" smtClean="0">
+                            <a:latin typeface="Cambria Math" panose="02040503050406030204" pitchFamily="18" charset="0"/>
+                          </a:rPr>
+                        </m:ctrlPr>
+                      </m:radPr>
+                      <m:deg/>
+                      <m:e>
+                        <m:nary>
+                          <m:naryPr>
+                            <m:chr m:val="∑"/>
+                            <m:ctrlPr>
+                              <a:rPr lang="en-US" i="1" smtClean="0">
+                                <a:latin typeface="Cambria Math" panose="02040503050406030204" pitchFamily="18" charset="0"/>
+                              </a:rPr>
+                            </m:ctrlPr>
+                          </m:naryPr>
+                          <m:sub>
+                            <m:r>
+                              <m:rPr>
+                                <m:brk m:alnAt="23"/>
+                              </m:rPr>
+                              <a:rPr lang="en-US" b="0" i="1" smtClean="0">
+                                <a:latin typeface="Cambria Math" panose="02040503050406030204" pitchFamily="18" charset="0"/>
+                              </a:rPr>
+                              <m:t>𝑖</m:t>
+                            </m:r>
+                            <m:r>
+                              <a:rPr lang="en-US" b="0" i="1" smtClean="0">
+                                <a:latin typeface="Cambria Math" panose="02040503050406030204" pitchFamily="18" charset="0"/>
+                              </a:rPr>
+                              <m:t>=1</m:t>
+                            </m:r>
+                          </m:sub>
+                          <m:sup>
+                            <m:sSub>
+                              <m:sSubPr>
+                                <m:ctrlPr>
+                                  <a:rPr lang="en-US" i="1" smtClean="0">
+                                    <a:latin typeface="Cambria Math" panose="02040503050406030204" pitchFamily="18" charset="0"/>
+                                  </a:rPr>
+                                </m:ctrlPr>
+                              </m:sSubPr>
+                              <m:e>
+                                <m:r>
+                                  <a:rPr lang="en-US" b="0" i="1" smtClean="0">
+                                    <a:latin typeface="Cambria Math" panose="02040503050406030204" pitchFamily="18" charset="0"/>
+                                  </a:rPr>
+                                  <m:t>𝑛</m:t>
+                                </m:r>
+                              </m:e>
+                              <m:sub>
+                                <m:r>
+                                  <a:rPr lang="en-US" b="0" i="1" smtClean="0">
+                                    <a:latin typeface="Cambria Math" panose="02040503050406030204" pitchFamily="18" charset="0"/>
+                                  </a:rPr>
+                                  <m:t>𝑘</m:t>
+                                </m:r>
+                              </m:sub>
+                            </m:sSub>
+                          </m:sup>
+                          <m:e>
+                            <m:nary>
+                              <m:naryPr>
+                                <m:chr m:val="∑"/>
+                                <m:ctrlPr>
+                                  <a:rPr lang="en-US" i="1" smtClean="0">
+                                    <a:latin typeface="Cambria Math" panose="02040503050406030204" pitchFamily="18" charset="0"/>
+                                  </a:rPr>
+                                </m:ctrlPr>
+                              </m:naryPr>
+                              <m:sub>
+                                <m:r>
+                                  <m:rPr>
+                                    <m:brk m:alnAt="23"/>
+                                  </m:rPr>
+                                  <a:rPr lang="en-US" b="0" i="1" smtClean="0">
+                                    <a:latin typeface="Cambria Math" panose="02040503050406030204" pitchFamily="18" charset="0"/>
+                                  </a:rPr>
+                                  <m:t>𝑗</m:t>
+                                </m:r>
+                                <m:r>
+                                  <a:rPr lang="en-US" b="0" i="1" smtClean="0">
+                                    <a:latin typeface="Cambria Math" panose="02040503050406030204" pitchFamily="18" charset="0"/>
+                                  </a:rPr>
+                                  <m:t>=1</m:t>
+                                </m:r>
+                              </m:sub>
+                              <m:sup>
+                                <m:sSub>
+                                  <m:sSubPr>
+                                    <m:ctrlPr>
+                                      <a:rPr lang="en-US" i="1" smtClean="0">
+                                        <a:latin typeface="Cambria Math" panose="02040503050406030204" pitchFamily="18" charset="0"/>
+                                      </a:rPr>
+                                    </m:ctrlPr>
+                                  </m:sSubPr>
+                                  <m:e>
+                                    <m:r>
+                                      <a:rPr lang="en-US" b="0" i="1" smtClean="0">
+                                        <a:latin typeface="Cambria Math" panose="02040503050406030204" pitchFamily="18" charset="0"/>
+                                      </a:rPr>
+                                      <m:t>𝑛</m:t>
+                                    </m:r>
+                                  </m:e>
+                                  <m:sub>
+                                    <m:r>
+                                      <a:rPr lang="en-US" b="0" i="1" smtClean="0">
+                                        <a:latin typeface="Cambria Math" panose="02040503050406030204" pitchFamily="18" charset="0"/>
+                                      </a:rPr>
+                                      <m:t>𝑘</m:t>
+                                    </m:r>
+                                  </m:sub>
+                                </m:sSub>
+                              </m:sup>
+                              <m:e>
+                                <m:sSup>
+                                  <m:sSupPr>
+                                    <m:ctrlPr>
+                                      <a:rPr lang="en-US" i="1" smtClean="0">
+                                        <a:latin typeface="Cambria Math" panose="02040503050406030204" pitchFamily="18" charset="0"/>
+                                      </a:rPr>
+                                    </m:ctrlPr>
+                                  </m:sSupPr>
+                                  <m:e>
+                                    <m:d>
+                                      <m:dPr>
+                                        <m:begChr m:val="|"/>
+                                        <m:endChr m:val="|"/>
+                                        <m:ctrlPr>
+                                          <a:rPr lang="en-US" i="1">
+                                            <a:latin typeface="Cambria Math" panose="02040503050406030204" pitchFamily="18" charset="0"/>
+                                          </a:rPr>
+                                        </m:ctrlPr>
+                                      </m:dPr>
+                                      <m:e>
+                                        <m:sSub>
+                                          <m:sSubPr>
+                                            <m:ctrlPr>
+                                              <a:rPr lang="en-US" i="1">
+                                                <a:latin typeface="Cambria Math" panose="02040503050406030204" pitchFamily="18" charset="0"/>
+                                              </a:rPr>
+                                            </m:ctrlPr>
+                                          </m:sSubPr>
+                                          <m:e>
+                                            <m:r>
+                                              <a:rPr lang="en-US" i="1">
+                                                <a:latin typeface="Cambria Math" panose="02040503050406030204" pitchFamily="18" charset="0"/>
+                                              </a:rPr>
+                                              <m:t>𝑎</m:t>
+                                            </m:r>
+                                          </m:e>
+                                          <m:sub>
+                                            <m:r>
+                                              <a:rPr lang="en-US" i="1">
+                                                <a:latin typeface="Cambria Math" panose="02040503050406030204" pitchFamily="18" charset="0"/>
+                                              </a:rPr>
+                                              <m:t>𝑖𝑗</m:t>
+                                            </m:r>
+                                          </m:sub>
+                                        </m:sSub>
+                                      </m:e>
+                                    </m:d>
+                                  </m:e>
+                                  <m:sup>
+                                    <m:r>
+                                      <a:rPr lang="en-US" b="0" i="1" smtClean="0">
+                                        <a:latin typeface="Cambria Math" panose="02040503050406030204" pitchFamily="18" charset="0"/>
+                                      </a:rPr>
+                                      <m:t>2</m:t>
+                                    </m:r>
+                                  </m:sup>
+                                </m:sSup>
+                              </m:e>
+                            </m:nary>
+                          </m:e>
+                        </m:nary>
+                      </m:e>
+                    </m:rad>
+                  </m:oMath>
+                </a14:m>
+                <a:endParaRPr lang="en-US" dirty="0"/>
+              </a:p>
+            </p:txBody>
+          </p:sp>
+        </mc:Choice>
+        <mc:Fallback>
+          <p:sp>
+            <p:nvSpPr>
+              <p:cNvPr id="5" name="Content Placeholder 4">
+                <a:extLst>
+                  <a:ext uri="{FF2B5EF4-FFF2-40B4-BE49-F238E27FC236}">
+                    <a16:creationId xmlns:a16="http://schemas.microsoft.com/office/drawing/2014/main" id="{F33B89D5-3A82-408F-97A1-CDBE8DD691FD}"/>
+                  </a:ext>
+                </a:extLst>
+              </p:cNvPr>
+              <p:cNvSpPr>
+                <a:spLocks noGrp="1" noRot="1" noChangeAspect="1" noMove="1" noResize="1" noEditPoints="1" noAdjustHandles="1" noChangeArrowheads="1" noChangeShapeType="1" noTextEdit="1"/>
+              </p:cNvSpPr>
+              <p:nvPr>
+                <p:ph sz="half" idx="2"/>
+              </p:nvPr>
+            </p:nvSpPr>
+            <p:spPr>
+              <a:blipFill>
+                <a:blip r:embed="rId3"/>
+                <a:stretch>
+                  <a:fillRect l="-2118" t="-2241"/>
+                </a:stretch>
+              </a:blipFill>
+            </p:spPr>
+            <p:txBody>
+              <a:bodyPr/>
+              <a:lstStyle/>
+              <a:p>
+                <a:r>
+                  <a:rPr lang="en-US">
+                    <a:noFill/>
+                  </a:rPr>
+                  <a:t> </a:t>
+                </a:r>
+              </a:p>
+            </p:txBody>
+          </p:sp>
+        </mc:Fallback>
+      </mc:AlternateContent>
+    </p:spTree>
+    <p:extLst>
+      <p:ext uri="{BB962C8B-B14F-4D97-AF65-F5344CB8AC3E}">
+        <p14:creationId xmlns:p14="http://schemas.microsoft.com/office/powerpoint/2010/main" val="4112332680"/>
+      </p:ext>
+    </p:extLst>
+  </p:cSld>
+  <p:clrMapOvr>
+    <a:masterClrMapping/>
+  </p:clrMapOvr>
+</p:sld>
+</file>
+
+<file path=ppt/slides/slide8.xml><?xml version="1.0" encoding="utf-8"?>
+<p:sld xmlns:a="http://schemas.openxmlformats.org/drawingml/2006/main" xmlns:r="http://schemas.openxmlformats.org/officeDocument/2006/relationships" xmlns:p="http://schemas.openxmlformats.org/presentationml/2006/main">
+  <p:cSld>
+    <p:spTree>
+      <p:nvGrpSpPr>
+        <p:cNvPr id="1" name=""/>
+        <p:cNvGrpSpPr/>
+        <p:nvPr/>
+      </p:nvGrpSpPr>
+      <p:grpSpPr>
+        <a:xfrm>
+          <a:off x="0" y="0"/>
+          <a:ext cx="0" cy="0"/>
+          <a:chOff x="0" y="0"/>
+          <a:chExt cx="0" cy="0"/>
+        </a:xfrm>
+      </p:grpSpPr>
+      <p:sp>
+        <p:nvSpPr>
+          <p:cNvPr id="2" name="Title 1">
+            <a:extLst>
+              <a:ext uri="{FF2B5EF4-FFF2-40B4-BE49-F238E27FC236}">
+                <a16:creationId xmlns:a16="http://schemas.microsoft.com/office/drawing/2014/main" id="{EF199DF5-E4BD-467F-AA35-B360C767A9C7}"/>
+              </a:ext>
+            </a:extLst>
+          </p:cNvPr>
+          <p:cNvSpPr>
+            <a:spLocks noGrp="1"/>
+          </p:cNvSpPr>
+          <p:nvPr>
+            <p:ph type="title"/>
+          </p:nvPr>
+        </p:nvSpPr>
+        <p:spPr/>
+        <p:txBody>
+          <a:bodyPr/>
+          <a:lstStyle/>
+          <a:p>
+            <a:r>
+              <a:rPr lang="en-US" dirty="0"/>
+              <a:t>Training and Tuning</a:t>
+            </a:r>
+          </a:p>
+        </p:txBody>
+      </p:sp>
+      <mc:AlternateContent xmlns:mc="http://schemas.openxmlformats.org/markup-compatibility/2006">
+        <mc:Choice xmlns:a14="http://schemas.microsoft.com/office/drawing/2010/main" Requires="a14">
+          <p:sp>
+            <p:nvSpPr>
+              <p:cNvPr id="3" name="Content Placeholder 2">
+                <a:extLst>
+                  <a:ext uri="{FF2B5EF4-FFF2-40B4-BE49-F238E27FC236}">
+                    <a16:creationId xmlns:a16="http://schemas.microsoft.com/office/drawing/2014/main" id="{4F171CC9-D5DF-4995-8D41-41095F73D8D8}"/>
+                  </a:ext>
+                </a:extLst>
+              </p:cNvPr>
+              <p:cNvSpPr>
+                <a:spLocks noGrp="1"/>
+              </p:cNvSpPr>
+              <p:nvPr>
+                <p:ph idx="1"/>
+              </p:nvPr>
+            </p:nvSpPr>
+            <p:spPr/>
+            <p:txBody>
+              <a:bodyPr/>
+              <a:lstStyle/>
+              <a:p>
+                <a:r>
+                  <a:rPr lang="en-US" dirty="0"/>
+                  <a:t>Loss Function – Multi-Class Cross Entropy Objective Function</a:t>
+                </a:r>
+              </a:p>
+              <a:p>
+                <a:pPr lvl="1"/>
+                <a14:m>
+                  <m:oMath xmlns:m="http://schemas.openxmlformats.org/officeDocument/2006/math">
+                    <m:r>
+                      <a:rPr lang="en-US" b="0" i="1" smtClean="0">
+                        <a:latin typeface="Cambria Math" panose="02040503050406030204" pitchFamily="18" charset="0"/>
+                      </a:rPr>
+                      <m:t>𝐼</m:t>
+                    </m:r>
+                    <m:r>
+                      <a:rPr lang="en-US" b="0" i="1" smtClean="0">
+                        <a:latin typeface="Cambria Math" panose="02040503050406030204" pitchFamily="18" charset="0"/>
+                      </a:rPr>
+                      <m:t>=− </m:t>
+                    </m:r>
+                    <m:nary>
+                      <m:naryPr>
+                        <m:chr m:val="∑"/>
+                        <m:ctrlPr>
+                          <a:rPr lang="en-US" b="0" i="1" smtClean="0">
+                            <a:latin typeface="Cambria Math" panose="02040503050406030204" pitchFamily="18" charset="0"/>
+                          </a:rPr>
+                        </m:ctrlPr>
+                      </m:naryPr>
+                      <m:sub>
+                        <m:r>
+                          <m:rPr>
+                            <m:brk m:alnAt="23"/>
+                          </m:rPr>
+                          <a:rPr lang="en-US" b="0" i="1" smtClean="0">
+                            <a:latin typeface="Cambria Math" panose="02040503050406030204" pitchFamily="18" charset="0"/>
+                          </a:rPr>
+                          <m:t>𝑛</m:t>
+                        </m:r>
+                        <m:r>
+                          <a:rPr lang="en-US" b="0" i="1" smtClean="0">
+                            <a:latin typeface="Cambria Math" panose="02040503050406030204" pitchFamily="18" charset="0"/>
+                          </a:rPr>
+                          <m:t>=1</m:t>
+                        </m:r>
+                      </m:sub>
+                      <m:sup>
+                        <m:r>
+                          <a:rPr lang="en-US" b="0" i="1" smtClean="0">
+                            <a:latin typeface="Cambria Math" panose="02040503050406030204" pitchFamily="18" charset="0"/>
+                          </a:rPr>
+                          <m:t>𝑁</m:t>
+                        </m:r>
+                      </m:sup>
+                      <m:e>
+                        <m:nary>
+                          <m:naryPr>
+                            <m:chr m:val="∑"/>
+                            <m:ctrlPr>
+                              <a:rPr lang="en-US" b="0" i="1" smtClean="0">
+                                <a:latin typeface="Cambria Math" panose="02040503050406030204" pitchFamily="18" charset="0"/>
+                              </a:rPr>
+                            </m:ctrlPr>
+                          </m:naryPr>
+                          <m:sub>
+                            <m:r>
+                              <m:rPr>
+                                <m:brk m:alnAt="23"/>
+                              </m:rPr>
+                              <a:rPr lang="en-US" b="0" i="1" smtClean="0">
+                                <a:latin typeface="Cambria Math" panose="02040503050406030204" pitchFamily="18" charset="0"/>
+                              </a:rPr>
+                              <m:t>𝑘</m:t>
+                            </m:r>
+                            <m:r>
+                              <a:rPr lang="en-US" b="0" i="1" smtClean="0">
+                                <a:latin typeface="Cambria Math" panose="02040503050406030204" pitchFamily="18" charset="0"/>
+                              </a:rPr>
+                              <m:t>=1</m:t>
+                            </m:r>
+                          </m:sub>
+                          <m:sup>
+                            <m:r>
+                              <a:rPr lang="en-US" b="0" i="1" smtClean="0">
+                                <a:latin typeface="Cambria Math" panose="02040503050406030204" pitchFamily="18" charset="0"/>
+                              </a:rPr>
+                              <m:t>𝐾</m:t>
+                            </m:r>
+                          </m:sup>
+                          <m:e>
+                            <m:sSub>
+                              <m:sSubPr>
+                                <m:ctrlPr>
+                                  <a:rPr lang="en-US" b="0" i="1" smtClean="0">
+                                    <a:latin typeface="Cambria Math" panose="02040503050406030204" pitchFamily="18" charset="0"/>
+                                  </a:rPr>
+                                </m:ctrlPr>
+                              </m:sSubPr>
+                              <m:e>
+                                <m:r>
+                                  <a:rPr lang="en-US" b="0" i="1" smtClean="0">
+                                    <a:latin typeface="Cambria Math" panose="02040503050406030204" pitchFamily="18" charset="0"/>
+                                  </a:rPr>
+                                  <m:t>𝑑</m:t>
+                                </m:r>
+                              </m:e>
+                              <m:sub>
+                                <m:r>
+                                  <a:rPr lang="en-US" b="0" i="1" smtClean="0">
+                                    <a:latin typeface="Cambria Math" panose="02040503050406030204" pitchFamily="18" charset="0"/>
+                                  </a:rPr>
+                                  <m:t>𝑛𝑘</m:t>
+                                </m:r>
+                              </m:sub>
+                            </m:sSub>
+                            <m:func>
+                              <m:funcPr>
+                                <m:ctrlPr>
+                                  <a:rPr lang="en-US" b="0" i="1" smtClean="0">
+                                    <a:latin typeface="Cambria Math" panose="02040503050406030204" pitchFamily="18" charset="0"/>
+                                  </a:rPr>
+                                </m:ctrlPr>
+                              </m:funcPr>
+                              <m:fName>
+                                <m:r>
+                                  <m:rPr>
+                                    <m:sty m:val="p"/>
+                                  </m:rPr>
+                                  <a:rPr lang="en-US" b="0" i="0" smtClean="0">
+                                    <a:latin typeface="Cambria Math" panose="02040503050406030204" pitchFamily="18" charset="0"/>
+                                  </a:rPr>
+                                  <m:t>log</m:t>
+                                </m:r>
+                              </m:fName>
+                              <m:e>
+                                <m:d>
+                                  <m:dPr>
+                                    <m:ctrlPr>
+                                      <a:rPr lang="en-US" b="0" i="1" smtClean="0">
+                                        <a:latin typeface="Cambria Math" panose="02040503050406030204" pitchFamily="18" charset="0"/>
+                                      </a:rPr>
+                                    </m:ctrlPr>
+                                  </m:dPr>
+                                  <m:e>
+                                    <m:r>
+                                      <a:rPr lang="en-US" b="0" i="1" smtClean="0">
+                                        <a:latin typeface="Cambria Math" panose="02040503050406030204" pitchFamily="18" charset="0"/>
+                                      </a:rPr>
+                                      <m:t>𝑃</m:t>
+                                    </m:r>
+                                    <m:d>
+                                      <m:dPr>
+                                        <m:ctrlPr>
+                                          <a:rPr lang="en-US" b="0" i="1" smtClean="0">
+                                            <a:latin typeface="Cambria Math" panose="02040503050406030204" pitchFamily="18" charset="0"/>
+                                          </a:rPr>
+                                        </m:ctrlPr>
+                                      </m:dPr>
+                                      <m:e>
+                                        <m:sSub>
+                                          <m:sSubPr>
+                                            <m:ctrlPr>
+                                              <a:rPr lang="en-US" b="0" i="1" smtClean="0">
+                                                <a:latin typeface="Cambria Math" panose="02040503050406030204" pitchFamily="18" charset="0"/>
+                                              </a:rPr>
+                                            </m:ctrlPr>
+                                          </m:sSubPr>
+                                          <m:e>
+                                            <m:r>
+                                              <a:rPr lang="en-US" b="0" i="1" smtClean="0">
+                                                <a:latin typeface="Cambria Math" panose="02040503050406030204" pitchFamily="18" charset="0"/>
+                                              </a:rPr>
+                                              <m:t>𝑦</m:t>
+                                            </m:r>
+                                          </m:e>
+                                          <m:sub>
+                                            <m:r>
+                                              <a:rPr lang="en-US" b="0" i="1" smtClean="0">
+                                                <a:latin typeface="Cambria Math" panose="02040503050406030204" pitchFamily="18" charset="0"/>
+                                              </a:rPr>
+                                              <m:t>𝑘</m:t>
+                                            </m:r>
+                                          </m:sub>
+                                        </m:sSub>
+                                      </m:e>
+                                      <m:e>
+                                        <m:sSubSup>
+                                          <m:sSubSupPr>
+                                            <m:ctrlPr>
+                                              <a:rPr lang="en-US" b="0" i="1" smtClean="0">
+                                                <a:latin typeface="Cambria Math" panose="02040503050406030204" pitchFamily="18" charset="0"/>
+                                              </a:rPr>
+                                            </m:ctrlPr>
+                                          </m:sSubSupPr>
+                                          <m:e>
+                                            <m:r>
+                                              <a:rPr lang="en-US" b="0" i="1" smtClean="0">
+                                                <a:latin typeface="Cambria Math" panose="02040503050406030204" pitchFamily="18" charset="0"/>
+                                              </a:rPr>
+                                              <m:t>𝑥</m:t>
+                                            </m:r>
+                                          </m:e>
+                                          <m:sub>
+                                            <m:r>
+                                              <a:rPr lang="en-US" b="0" i="1" smtClean="0">
+                                                <a:latin typeface="Cambria Math" panose="02040503050406030204" pitchFamily="18" charset="0"/>
+                                              </a:rPr>
+                                              <m:t>1:</m:t>
+                                            </m:r>
+                                            <m:r>
+                                              <a:rPr lang="en-US" b="0" i="1" smtClean="0">
+                                                <a:latin typeface="Cambria Math" panose="02040503050406030204" pitchFamily="18" charset="0"/>
+                                              </a:rPr>
+                                              <m:t>𝑇</m:t>
+                                            </m:r>
+                                          </m:sub>
+                                          <m:sup>
+                                            <m:d>
+                                              <m:dPr>
+                                                <m:ctrlPr>
+                                                  <a:rPr lang="en-US" b="0" i="1" smtClean="0">
+                                                    <a:latin typeface="Cambria Math" panose="02040503050406030204" pitchFamily="18" charset="0"/>
+                                                  </a:rPr>
+                                                </m:ctrlPr>
+                                              </m:dPr>
+                                              <m:e>
+                                                <m:r>
+                                                  <a:rPr lang="en-US" b="0" i="1" smtClean="0">
+                                                    <a:latin typeface="Cambria Math" panose="02040503050406030204" pitchFamily="18" charset="0"/>
+                                                  </a:rPr>
+                                                  <m:t>𝑛</m:t>
+                                                </m:r>
+                                              </m:e>
+                                            </m:d>
+                                          </m:sup>
+                                        </m:sSubSup>
+                                      </m:e>
+                                    </m:d>
+                                  </m:e>
+                                </m:d>
+                              </m:e>
+                            </m:func>
+                          </m:e>
+                        </m:nary>
+                      </m:e>
+                    </m:nary>
+                    <m:r>
+                      <a:rPr lang="en-US" b="0" i="1" smtClean="0">
+                        <a:latin typeface="Cambria Math" panose="02040503050406030204" pitchFamily="18" charset="0"/>
+                      </a:rPr>
+                      <m:t>+ </m:t>
+                    </m:r>
+                    <m:sSub>
+                      <m:sSubPr>
+                        <m:ctrlPr>
+                          <a:rPr lang="en-US" b="0" i="1" smtClean="0">
+                            <a:latin typeface="Cambria Math" panose="02040503050406030204" pitchFamily="18" charset="0"/>
+                          </a:rPr>
+                        </m:ctrlPr>
+                      </m:sSubPr>
+                      <m:e>
+                        <m:r>
+                          <a:rPr lang="en-US" b="0" i="1" smtClean="0">
+                            <a:latin typeface="Cambria Math" panose="02040503050406030204" pitchFamily="18" charset="0"/>
+                          </a:rPr>
+                          <m:t>𝐼</m:t>
+                        </m:r>
+                      </m:e>
+                      <m:sub>
+                        <m:r>
+                          <a:rPr lang="en-US" b="0" i="1" smtClean="0">
+                            <a:latin typeface="Cambria Math" panose="02040503050406030204" pitchFamily="18" charset="0"/>
+                          </a:rPr>
+                          <m:t>𝑝</m:t>
+                        </m:r>
+                      </m:sub>
+                    </m:sSub>
+                  </m:oMath>
+                </a14:m>
+                <a:endParaRPr lang="en-US" dirty="0"/>
+              </a:p>
+              <a:p>
+                <a:r>
+                  <a:rPr lang="en-US" dirty="0"/>
+                  <a:t>Adam Optimizer</a:t>
+                </a:r>
+              </a:p>
+              <a:p>
+                <a:r>
+                  <a:rPr lang="en-US" dirty="0"/>
+                  <a:t>Other Hyperparameters set via grid search</a:t>
+                </a:r>
+              </a:p>
+              <a:p>
+                <a:pPr marL="457200" lvl="1" indent="0">
+                  <a:buNone/>
+                </a:pPr>
+                <a:endParaRPr lang="en-US" dirty="0"/>
+              </a:p>
+            </p:txBody>
+          </p:sp>
+        </mc:Choice>
+        <mc:Fallback>
+          <p:sp>
+            <p:nvSpPr>
+              <p:cNvPr id="3" name="Content Placeholder 2">
+                <a:extLst>
+                  <a:ext uri="{FF2B5EF4-FFF2-40B4-BE49-F238E27FC236}">
+                    <a16:creationId xmlns:a16="http://schemas.microsoft.com/office/drawing/2014/main" id="{4F171CC9-D5DF-4995-8D41-41095F73D8D8}"/>
+                  </a:ext>
+                </a:extLst>
+              </p:cNvPr>
+              <p:cNvSpPr>
+                <a:spLocks noGrp="1" noRot="1" noChangeAspect="1" noMove="1" noResize="1" noEditPoints="1" noAdjustHandles="1" noChangeArrowheads="1" noChangeShapeType="1" noTextEdit="1"/>
+              </p:cNvSpPr>
+              <p:nvPr>
+                <p:ph idx="1"/>
+              </p:nvPr>
+            </p:nvSpPr>
+            <p:spPr>
+              <a:blipFill>
+                <a:blip r:embed="rId2"/>
+                <a:stretch>
+                  <a:fillRect l="-1043" t="-2241"/>
+                </a:stretch>
+              </a:blipFill>
+            </p:spPr>
+            <p:txBody>
+              <a:bodyPr/>
+              <a:lstStyle/>
+              <a:p>
+                <a:r>
+                  <a:rPr lang="en-US">
+                    <a:noFill/>
+                  </a:rPr>
+                  <a:t> </a:t>
+                </a:r>
+              </a:p>
+            </p:txBody>
+          </p:sp>
+        </mc:Fallback>
+      </mc:AlternateContent>
+    </p:spTree>
+    <p:extLst>
+      <p:ext uri="{BB962C8B-B14F-4D97-AF65-F5344CB8AC3E}">
+        <p14:creationId xmlns:p14="http://schemas.microsoft.com/office/powerpoint/2010/main" val="3978024795"/>
+      </p:ext>
+    </p:extLst>
+  </p:cSld>
+  <p:clrMapOvr>
+    <a:masterClrMapping/>
+  </p:clrMapOvr>
+</p:sld>
+</file>
+
 <file path=ppt/theme/theme1.xml><?xml version="1.0" encoding="utf-8"?>
 <a:theme xmlns:a="http://schemas.openxmlformats.org/drawingml/2006/main" name="Office Theme">
   <a:themeElements>

</xml_diff>